<commit_message>
[Docs] Scene Flow Update
씬 별 흐름도 문서 업데이트
</commit_message>
<xml_diff>
--- a/Project_Design/한세웅/5조_SkyPower_씬별흐름도.pptx
+++ b/Project_Design/한세웅/5조_SkyPower_씬별흐름도.pptx
@@ -10,6 +10,15 @@
     <p:sldId id="261" r:id="rId4"/>
     <p:sldId id="257" r:id="rId5"/>
     <p:sldId id="262" r:id="rId6"/>
+    <p:sldId id="263" r:id="rId7"/>
+    <p:sldId id="264" r:id="rId8"/>
+    <p:sldId id="265" r:id="rId9"/>
+    <p:sldId id="266" r:id="rId10"/>
+    <p:sldId id="267" r:id="rId11"/>
+    <p:sldId id="268" r:id="rId12"/>
+    <p:sldId id="269" r:id="rId13"/>
+    <p:sldId id="270" r:id="rId14"/>
+    <p:sldId id="271" r:id="rId15"/>
   </p:sldIdLst>
   <p:sldSz cx="12192000" cy="6858000"/>
   <p:notesSz cx="6858000" cy="9144000"/>
@@ -6860,6 +6869,1582 @@
 </p:sld>
 </file>
 
+<file path=ppt/slides/slide10.xml><?xml version="1.0" encoding="utf-8"?>
+<p:sld xmlns:a="http://schemas.openxmlformats.org/drawingml/2006/main" xmlns:r="http://schemas.openxmlformats.org/officeDocument/2006/relationships" xmlns:p="http://schemas.openxmlformats.org/presentationml/2006/main">
+  <p:cSld>
+    <p:spTree>
+      <p:nvGrpSpPr>
+        <p:cNvPr id="1" name="">
+          <a:extLst>
+            <a:ext uri="{FF2B5EF4-FFF2-40B4-BE49-F238E27FC236}">
+              <a16:creationId xmlns:a16="http://schemas.microsoft.com/office/drawing/2014/main" id="{4A808667-87BF-66FB-4E0F-EF1704E0ED0B}"/>
+            </a:ext>
+          </a:extLst>
+        </p:cNvPr>
+        <p:cNvGrpSpPr/>
+        <p:nvPr/>
+      </p:nvGrpSpPr>
+      <p:grpSpPr>
+        <a:xfrm>
+          <a:off x="0" y="0"/>
+          <a:ext cx="0" cy="0"/>
+          <a:chOff x="0" y="0"/>
+          <a:chExt cx="0" cy="0"/>
+        </a:xfrm>
+      </p:grpSpPr>
+      <p:sp>
+        <p:nvSpPr>
+          <p:cNvPr id="3" name="사각형: 잘린 대각선 방향 모서리 2">
+            <a:extLst>
+              <a:ext uri="{FF2B5EF4-FFF2-40B4-BE49-F238E27FC236}">
+                <a16:creationId xmlns:a16="http://schemas.microsoft.com/office/drawing/2014/main" id="{CE9FE372-FEE5-349C-0F95-AAB8C42C2B0C}"/>
+              </a:ext>
+            </a:extLst>
+          </p:cNvPr>
+          <p:cNvSpPr/>
+          <p:nvPr/>
+        </p:nvSpPr>
+        <p:spPr>
+          <a:xfrm>
+            <a:off x="212436" y="230909"/>
+            <a:ext cx="11767127" cy="6437746"/>
+          </a:xfrm>
+          <a:prstGeom prst="snip2DiagRect">
+            <a:avLst>
+              <a:gd name="adj1" fmla="val 0"/>
+              <a:gd name="adj2" fmla="val 6911"/>
+            </a:avLst>
+          </a:prstGeom>
+          <a:noFill/>
+          <a:ln w="53975">
+            <a:solidFill>
+              <a:schemeClr val="tx1"/>
+            </a:solidFill>
+          </a:ln>
+        </p:spPr>
+        <p:style>
+          <a:lnRef idx="2">
+            <a:schemeClr val="accent1">
+              <a:shade val="15000"/>
+            </a:schemeClr>
+          </a:lnRef>
+          <a:fillRef idx="1">
+            <a:schemeClr val="accent1"/>
+          </a:fillRef>
+          <a:effectRef idx="0">
+            <a:schemeClr val="accent1"/>
+          </a:effectRef>
+          <a:fontRef idx="minor">
+            <a:schemeClr val="lt1"/>
+          </a:fontRef>
+        </p:style>
+        <p:txBody>
+          <a:bodyPr rtlCol="0" anchor="ctr"/>
+          <a:lstStyle/>
+          <a:p>
+            <a:pPr algn="ctr"/>
+            <a:endParaRPr lang="ko-KR" altLang="en-US"/>
+          </a:p>
+        </p:txBody>
+      </p:sp>
+      <p:sp>
+        <p:nvSpPr>
+          <p:cNvPr id="4" name="직사각형 3">
+            <a:extLst>
+              <a:ext uri="{FF2B5EF4-FFF2-40B4-BE49-F238E27FC236}">
+                <a16:creationId xmlns:a16="http://schemas.microsoft.com/office/drawing/2014/main" id="{2876D983-80B5-3659-7DEA-18973C65252E}"/>
+              </a:ext>
+            </a:extLst>
+          </p:cNvPr>
+          <p:cNvSpPr/>
+          <p:nvPr/>
+        </p:nvSpPr>
+        <p:spPr>
+          <a:xfrm>
+            <a:off x="800100" y="491836"/>
+            <a:ext cx="10672401" cy="432089"/>
+          </a:xfrm>
+          <a:prstGeom prst="rect">
+            <a:avLst/>
+          </a:prstGeom>
+          <a:noFill/>
+          <a:ln>
+            <a:noFill/>
+          </a:ln>
+        </p:spPr>
+        <p:style>
+          <a:lnRef idx="2">
+            <a:schemeClr val="accent1">
+              <a:shade val="15000"/>
+            </a:schemeClr>
+          </a:lnRef>
+          <a:fillRef idx="1">
+            <a:schemeClr val="accent1"/>
+          </a:fillRef>
+          <a:effectRef idx="0">
+            <a:schemeClr val="accent1"/>
+          </a:effectRef>
+          <a:fontRef idx="minor">
+            <a:schemeClr val="lt1"/>
+          </a:fontRef>
+        </p:style>
+        <p:txBody>
+          <a:bodyPr rtlCol="0" anchor="ctr"/>
+          <a:lstStyle/>
+          <a:p>
+            <a:pPr algn="l"/>
+            <a:r>
+              <a:rPr lang="ko-KR" altLang="en-US" dirty="0">
+                <a:solidFill>
+                  <a:schemeClr val="tx1"/>
+                </a:solidFill>
+                <a:latin typeface="페이퍼로지 6 SemiBold" pitchFamily="2" charset="-127"/>
+                <a:ea typeface="페이퍼로지 6 SemiBold" pitchFamily="2" charset="-127"/>
+                <a:cs typeface="Pretendard Medium" panose="02000603000000020004" pitchFamily="2" charset="-127"/>
+              </a:rPr>
+              <a:t>스타트 씬 흐름도</a:t>
+            </a:r>
+          </a:p>
+        </p:txBody>
+      </p:sp>
+      <p:sp>
+        <p:nvSpPr>
+          <p:cNvPr id="5" name="다이아몬드 4">
+            <a:extLst>
+              <a:ext uri="{FF2B5EF4-FFF2-40B4-BE49-F238E27FC236}">
+                <a16:creationId xmlns:a16="http://schemas.microsoft.com/office/drawing/2014/main" id="{726DC9A3-BB47-7A8A-1514-A07EB5BE4B24}"/>
+              </a:ext>
+            </a:extLst>
+          </p:cNvPr>
+          <p:cNvSpPr/>
+          <p:nvPr/>
+        </p:nvSpPr>
+        <p:spPr>
+          <a:xfrm>
+            <a:off x="430718" y="563491"/>
+            <a:ext cx="288780" cy="288780"/>
+          </a:xfrm>
+          <a:prstGeom prst="diamond">
+            <a:avLst/>
+          </a:prstGeom>
+          <a:noFill/>
+          <a:ln w="19050">
+            <a:solidFill>
+              <a:schemeClr val="tx1"/>
+            </a:solidFill>
+          </a:ln>
+        </p:spPr>
+        <p:style>
+          <a:lnRef idx="2">
+            <a:schemeClr val="accent1">
+              <a:shade val="15000"/>
+            </a:schemeClr>
+          </a:lnRef>
+          <a:fillRef idx="1">
+            <a:schemeClr val="accent1"/>
+          </a:fillRef>
+          <a:effectRef idx="0">
+            <a:schemeClr val="accent1"/>
+          </a:effectRef>
+          <a:fontRef idx="minor">
+            <a:schemeClr val="lt1"/>
+          </a:fontRef>
+        </p:style>
+        <p:txBody>
+          <a:bodyPr rtlCol="0" anchor="ctr"/>
+          <a:lstStyle/>
+          <a:p>
+            <a:pPr algn="l"/>
+            <a:endParaRPr lang="ko-KR" altLang="en-US" sz="1600" dirty="0">
+              <a:solidFill>
+                <a:schemeClr val="tx1"/>
+              </a:solidFill>
+              <a:latin typeface="페이퍼로지 5 Medium" pitchFamily="2" charset="-127"/>
+              <a:ea typeface="페이퍼로지 5 Medium" pitchFamily="2" charset="-127"/>
+              <a:cs typeface="Pretendard Medium" panose="02000603000000020004" pitchFamily="2" charset="-127"/>
+            </a:endParaRPr>
+          </a:p>
+        </p:txBody>
+      </p:sp>
+      <p:sp>
+        <p:nvSpPr>
+          <p:cNvPr id="6" name="순서도: 수행의 시작/종료 5">
+            <a:extLst>
+              <a:ext uri="{FF2B5EF4-FFF2-40B4-BE49-F238E27FC236}">
+                <a16:creationId xmlns:a16="http://schemas.microsoft.com/office/drawing/2014/main" id="{6B01D37B-7522-0753-7B13-EC239F78741B}"/>
+              </a:ext>
+            </a:extLst>
+          </p:cNvPr>
+          <p:cNvSpPr/>
+          <p:nvPr/>
+        </p:nvSpPr>
+        <p:spPr>
+          <a:xfrm>
+            <a:off x="800100" y="1233829"/>
+            <a:ext cx="1381126" cy="481066"/>
+          </a:xfrm>
+          <a:prstGeom prst="flowChartTerminator">
+            <a:avLst/>
+          </a:prstGeom>
+          <a:solidFill>
+            <a:schemeClr val="accent2"/>
+          </a:solidFill>
+          <a:ln>
+            <a:solidFill>
+              <a:schemeClr val="tx1"/>
+            </a:solidFill>
+          </a:ln>
+        </p:spPr>
+        <p:style>
+          <a:lnRef idx="2">
+            <a:schemeClr val="accent1">
+              <a:shade val="15000"/>
+            </a:schemeClr>
+          </a:lnRef>
+          <a:fillRef idx="1">
+            <a:schemeClr val="accent1"/>
+          </a:fillRef>
+          <a:effectRef idx="0">
+            <a:schemeClr val="accent1"/>
+          </a:effectRef>
+          <a:fontRef idx="minor">
+            <a:schemeClr val="lt1"/>
+          </a:fontRef>
+        </p:style>
+        <p:txBody>
+          <a:bodyPr rtlCol="0" anchor="ctr"/>
+          <a:lstStyle/>
+          <a:p>
+            <a:pPr algn="ctr"/>
+            <a:r>
+              <a:rPr lang="ko-KR" altLang="en-US" sz="1200" dirty="0">
+                <a:solidFill>
+                  <a:schemeClr val="tx1"/>
+                </a:solidFill>
+                <a:latin typeface="페이퍼로지 4 Regular" pitchFamily="2" charset="-127"/>
+                <a:ea typeface="페이퍼로지 4 Regular" pitchFamily="2" charset="-127"/>
+              </a:rPr>
+              <a:t>시작</a:t>
+            </a:r>
+          </a:p>
+        </p:txBody>
+      </p:sp>
+      <p:sp>
+        <p:nvSpPr>
+          <p:cNvPr id="7" name="순서도: 수행의 시작/종료 6">
+            <a:extLst>
+              <a:ext uri="{FF2B5EF4-FFF2-40B4-BE49-F238E27FC236}">
+                <a16:creationId xmlns:a16="http://schemas.microsoft.com/office/drawing/2014/main" id="{319345FA-3615-DBDB-3576-73B2D176AC69}"/>
+              </a:ext>
+            </a:extLst>
+          </p:cNvPr>
+          <p:cNvSpPr/>
+          <p:nvPr/>
+        </p:nvSpPr>
+        <p:spPr>
+          <a:xfrm>
+            <a:off x="800100" y="5383638"/>
+            <a:ext cx="1381126" cy="481066"/>
+          </a:xfrm>
+          <a:prstGeom prst="flowChartTerminator">
+            <a:avLst/>
+          </a:prstGeom>
+          <a:solidFill>
+            <a:schemeClr val="accent2"/>
+          </a:solidFill>
+          <a:ln>
+            <a:solidFill>
+              <a:schemeClr val="tx1"/>
+            </a:solidFill>
+          </a:ln>
+        </p:spPr>
+        <p:style>
+          <a:lnRef idx="2">
+            <a:schemeClr val="accent1">
+              <a:shade val="15000"/>
+            </a:schemeClr>
+          </a:lnRef>
+          <a:fillRef idx="1">
+            <a:schemeClr val="accent1"/>
+          </a:fillRef>
+          <a:effectRef idx="0">
+            <a:schemeClr val="accent1"/>
+          </a:effectRef>
+          <a:fontRef idx="minor">
+            <a:schemeClr val="lt1"/>
+          </a:fontRef>
+        </p:style>
+        <p:txBody>
+          <a:bodyPr rtlCol="0" anchor="ctr"/>
+          <a:lstStyle/>
+          <a:p>
+            <a:pPr algn="ctr"/>
+            <a:r>
+              <a:rPr lang="ko-KR" altLang="en-US" sz="1200" dirty="0">
+                <a:solidFill>
+                  <a:schemeClr val="tx1"/>
+                </a:solidFill>
+                <a:latin typeface="페이퍼로지 4 Regular" pitchFamily="2" charset="-127"/>
+                <a:ea typeface="페이퍼로지 4 Regular" pitchFamily="2" charset="-127"/>
+              </a:rPr>
+              <a:t>종료</a:t>
+            </a:r>
+          </a:p>
+        </p:txBody>
+      </p:sp>
+      <p:sp>
+        <p:nvSpPr>
+          <p:cNvPr id="8" name="순서도: 대체 처리 7">
+            <a:extLst>
+              <a:ext uri="{FF2B5EF4-FFF2-40B4-BE49-F238E27FC236}">
+                <a16:creationId xmlns:a16="http://schemas.microsoft.com/office/drawing/2014/main" id="{367BA1D6-AD4C-28F2-C7EA-8FA661810F6F}"/>
+              </a:ext>
+            </a:extLst>
+          </p:cNvPr>
+          <p:cNvSpPr/>
+          <p:nvPr/>
+        </p:nvSpPr>
+        <p:spPr>
+          <a:xfrm>
+            <a:off x="800100" y="1986016"/>
+            <a:ext cx="1381126" cy="481066"/>
+          </a:xfrm>
+          <a:prstGeom prst="flowChartAlternateProcess">
+            <a:avLst/>
+          </a:prstGeom>
+          <a:noFill/>
+          <a:ln>
+            <a:solidFill>
+              <a:schemeClr val="tx1"/>
+            </a:solidFill>
+          </a:ln>
+        </p:spPr>
+        <p:style>
+          <a:lnRef idx="2">
+            <a:schemeClr val="accent1">
+              <a:shade val="15000"/>
+            </a:schemeClr>
+          </a:lnRef>
+          <a:fillRef idx="1">
+            <a:schemeClr val="accent1"/>
+          </a:fillRef>
+          <a:effectRef idx="0">
+            <a:schemeClr val="accent1"/>
+          </a:effectRef>
+          <a:fontRef idx="minor">
+            <a:schemeClr val="lt1"/>
+          </a:fontRef>
+        </p:style>
+        <p:txBody>
+          <a:bodyPr rtlCol="0" anchor="ctr"/>
+          <a:lstStyle/>
+          <a:p>
+            <a:pPr algn="ctr"/>
+            <a:endParaRPr lang="ko-KR" altLang="en-US" sz="1200" dirty="0">
+              <a:solidFill>
+                <a:schemeClr val="tx1"/>
+              </a:solidFill>
+              <a:latin typeface="페이퍼로지 4 Regular" pitchFamily="2" charset="-127"/>
+              <a:ea typeface="페이퍼로지 4 Regular" pitchFamily="2" charset="-127"/>
+            </a:endParaRPr>
+          </a:p>
+        </p:txBody>
+      </p:sp>
+    </p:spTree>
+    <p:extLst>
+      <p:ext uri="{BB962C8B-B14F-4D97-AF65-F5344CB8AC3E}">
+        <p14:creationId xmlns:p14="http://schemas.microsoft.com/office/powerpoint/2010/main" val="736089726"/>
+      </p:ext>
+    </p:extLst>
+  </p:cSld>
+  <p:clrMapOvr>
+    <a:masterClrMapping/>
+  </p:clrMapOvr>
+</p:sld>
+</file>
+
+<file path=ppt/slides/slide11.xml><?xml version="1.0" encoding="utf-8"?>
+<p:sld xmlns:a="http://schemas.openxmlformats.org/drawingml/2006/main" xmlns:r="http://schemas.openxmlformats.org/officeDocument/2006/relationships" xmlns:p="http://schemas.openxmlformats.org/presentationml/2006/main">
+  <p:cSld>
+    <p:spTree>
+      <p:nvGrpSpPr>
+        <p:cNvPr id="1" name="">
+          <a:extLst>
+            <a:ext uri="{FF2B5EF4-FFF2-40B4-BE49-F238E27FC236}">
+              <a16:creationId xmlns:a16="http://schemas.microsoft.com/office/drawing/2014/main" id="{B5BC1D98-ED65-9D89-E10B-F369894DAA68}"/>
+            </a:ext>
+          </a:extLst>
+        </p:cNvPr>
+        <p:cNvGrpSpPr/>
+        <p:nvPr/>
+      </p:nvGrpSpPr>
+      <p:grpSpPr>
+        <a:xfrm>
+          <a:off x="0" y="0"/>
+          <a:ext cx="0" cy="0"/>
+          <a:chOff x="0" y="0"/>
+          <a:chExt cx="0" cy="0"/>
+        </a:xfrm>
+      </p:grpSpPr>
+      <p:sp>
+        <p:nvSpPr>
+          <p:cNvPr id="3" name="사각형: 잘린 대각선 방향 모서리 2">
+            <a:extLst>
+              <a:ext uri="{FF2B5EF4-FFF2-40B4-BE49-F238E27FC236}">
+                <a16:creationId xmlns:a16="http://schemas.microsoft.com/office/drawing/2014/main" id="{25F0E995-3FDB-A976-08F9-EBE96CE49669}"/>
+              </a:ext>
+            </a:extLst>
+          </p:cNvPr>
+          <p:cNvSpPr/>
+          <p:nvPr/>
+        </p:nvSpPr>
+        <p:spPr>
+          <a:xfrm>
+            <a:off x="212436" y="230909"/>
+            <a:ext cx="11767127" cy="6437746"/>
+          </a:xfrm>
+          <a:prstGeom prst="snip2DiagRect">
+            <a:avLst>
+              <a:gd name="adj1" fmla="val 0"/>
+              <a:gd name="adj2" fmla="val 6911"/>
+            </a:avLst>
+          </a:prstGeom>
+          <a:noFill/>
+          <a:ln w="53975">
+            <a:solidFill>
+              <a:schemeClr val="tx1"/>
+            </a:solidFill>
+          </a:ln>
+        </p:spPr>
+        <p:style>
+          <a:lnRef idx="2">
+            <a:schemeClr val="accent1">
+              <a:shade val="15000"/>
+            </a:schemeClr>
+          </a:lnRef>
+          <a:fillRef idx="1">
+            <a:schemeClr val="accent1"/>
+          </a:fillRef>
+          <a:effectRef idx="0">
+            <a:schemeClr val="accent1"/>
+          </a:effectRef>
+          <a:fontRef idx="minor">
+            <a:schemeClr val="lt1"/>
+          </a:fontRef>
+        </p:style>
+        <p:txBody>
+          <a:bodyPr rtlCol="0" anchor="ctr"/>
+          <a:lstStyle/>
+          <a:p>
+            <a:pPr algn="ctr"/>
+            <a:endParaRPr lang="ko-KR" altLang="en-US"/>
+          </a:p>
+        </p:txBody>
+      </p:sp>
+      <p:sp>
+        <p:nvSpPr>
+          <p:cNvPr id="4" name="직사각형 3">
+            <a:extLst>
+              <a:ext uri="{FF2B5EF4-FFF2-40B4-BE49-F238E27FC236}">
+                <a16:creationId xmlns:a16="http://schemas.microsoft.com/office/drawing/2014/main" id="{52877F82-7035-FB76-817C-07E11C778D0A}"/>
+              </a:ext>
+            </a:extLst>
+          </p:cNvPr>
+          <p:cNvSpPr/>
+          <p:nvPr/>
+        </p:nvSpPr>
+        <p:spPr>
+          <a:xfrm>
+            <a:off x="800100" y="491836"/>
+            <a:ext cx="10672401" cy="432089"/>
+          </a:xfrm>
+          <a:prstGeom prst="rect">
+            <a:avLst/>
+          </a:prstGeom>
+          <a:noFill/>
+          <a:ln>
+            <a:noFill/>
+          </a:ln>
+        </p:spPr>
+        <p:style>
+          <a:lnRef idx="2">
+            <a:schemeClr val="accent1">
+              <a:shade val="15000"/>
+            </a:schemeClr>
+          </a:lnRef>
+          <a:fillRef idx="1">
+            <a:schemeClr val="accent1"/>
+          </a:fillRef>
+          <a:effectRef idx="0">
+            <a:schemeClr val="accent1"/>
+          </a:effectRef>
+          <a:fontRef idx="minor">
+            <a:schemeClr val="lt1"/>
+          </a:fontRef>
+        </p:style>
+        <p:txBody>
+          <a:bodyPr rtlCol="0" anchor="ctr"/>
+          <a:lstStyle/>
+          <a:p>
+            <a:pPr algn="l"/>
+            <a:r>
+              <a:rPr lang="ko-KR" altLang="en-US" dirty="0">
+                <a:solidFill>
+                  <a:schemeClr val="tx1"/>
+                </a:solidFill>
+                <a:latin typeface="페이퍼로지 6 SemiBold" pitchFamily="2" charset="-127"/>
+                <a:ea typeface="페이퍼로지 6 SemiBold" pitchFamily="2" charset="-127"/>
+                <a:cs typeface="Pretendard Medium" panose="02000603000000020004" pitchFamily="2" charset="-127"/>
+              </a:rPr>
+              <a:t>스타트 씬 흐름도</a:t>
+            </a:r>
+          </a:p>
+        </p:txBody>
+      </p:sp>
+      <p:sp>
+        <p:nvSpPr>
+          <p:cNvPr id="5" name="다이아몬드 4">
+            <a:extLst>
+              <a:ext uri="{FF2B5EF4-FFF2-40B4-BE49-F238E27FC236}">
+                <a16:creationId xmlns:a16="http://schemas.microsoft.com/office/drawing/2014/main" id="{DBA9AEBD-EFCE-49F3-2BE9-5C74F588AC19}"/>
+              </a:ext>
+            </a:extLst>
+          </p:cNvPr>
+          <p:cNvSpPr/>
+          <p:nvPr/>
+        </p:nvSpPr>
+        <p:spPr>
+          <a:xfrm>
+            <a:off x="430718" y="563491"/>
+            <a:ext cx="288780" cy="288780"/>
+          </a:xfrm>
+          <a:prstGeom prst="diamond">
+            <a:avLst/>
+          </a:prstGeom>
+          <a:noFill/>
+          <a:ln w="19050">
+            <a:solidFill>
+              <a:schemeClr val="tx1"/>
+            </a:solidFill>
+          </a:ln>
+        </p:spPr>
+        <p:style>
+          <a:lnRef idx="2">
+            <a:schemeClr val="accent1">
+              <a:shade val="15000"/>
+            </a:schemeClr>
+          </a:lnRef>
+          <a:fillRef idx="1">
+            <a:schemeClr val="accent1"/>
+          </a:fillRef>
+          <a:effectRef idx="0">
+            <a:schemeClr val="accent1"/>
+          </a:effectRef>
+          <a:fontRef idx="minor">
+            <a:schemeClr val="lt1"/>
+          </a:fontRef>
+        </p:style>
+        <p:txBody>
+          <a:bodyPr rtlCol="0" anchor="ctr"/>
+          <a:lstStyle/>
+          <a:p>
+            <a:pPr algn="l"/>
+            <a:endParaRPr lang="ko-KR" altLang="en-US" sz="1600" dirty="0">
+              <a:solidFill>
+                <a:schemeClr val="tx1"/>
+              </a:solidFill>
+              <a:latin typeface="페이퍼로지 5 Medium" pitchFamily="2" charset="-127"/>
+              <a:ea typeface="페이퍼로지 5 Medium" pitchFamily="2" charset="-127"/>
+              <a:cs typeface="Pretendard Medium" panose="02000603000000020004" pitchFamily="2" charset="-127"/>
+            </a:endParaRPr>
+          </a:p>
+        </p:txBody>
+      </p:sp>
+      <p:sp>
+        <p:nvSpPr>
+          <p:cNvPr id="6" name="순서도: 수행의 시작/종료 5">
+            <a:extLst>
+              <a:ext uri="{FF2B5EF4-FFF2-40B4-BE49-F238E27FC236}">
+                <a16:creationId xmlns:a16="http://schemas.microsoft.com/office/drawing/2014/main" id="{804B50C5-0F02-BB17-EF24-AF253D32377C}"/>
+              </a:ext>
+            </a:extLst>
+          </p:cNvPr>
+          <p:cNvSpPr/>
+          <p:nvPr/>
+        </p:nvSpPr>
+        <p:spPr>
+          <a:xfrm>
+            <a:off x="800100" y="1233829"/>
+            <a:ext cx="1381126" cy="481066"/>
+          </a:xfrm>
+          <a:prstGeom prst="flowChartTerminator">
+            <a:avLst/>
+          </a:prstGeom>
+          <a:solidFill>
+            <a:schemeClr val="accent2"/>
+          </a:solidFill>
+          <a:ln>
+            <a:solidFill>
+              <a:schemeClr val="tx1"/>
+            </a:solidFill>
+          </a:ln>
+        </p:spPr>
+        <p:style>
+          <a:lnRef idx="2">
+            <a:schemeClr val="accent1">
+              <a:shade val="15000"/>
+            </a:schemeClr>
+          </a:lnRef>
+          <a:fillRef idx="1">
+            <a:schemeClr val="accent1"/>
+          </a:fillRef>
+          <a:effectRef idx="0">
+            <a:schemeClr val="accent1"/>
+          </a:effectRef>
+          <a:fontRef idx="minor">
+            <a:schemeClr val="lt1"/>
+          </a:fontRef>
+        </p:style>
+        <p:txBody>
+          <a:bodyPr rtlCol="0" anchor="ctr"/>
+          <a:lstStyle/>
+          <a:p>
+            <a:pPr algn="ctr"/>
+            <a:r>
+              <a:rPr lang="ko-KR" altLang="en-US" sz="1200" dirty="0">
+                <a:solidFill>
+                  <a:schemeClr val="tx1"/>
+                </a:solidFill>
+                <a:latin typeface="페이퍼로지 4 Regular" pitchFamily="2" charset="-127"/>
+                <a:ea typeface="페이퍼로지 4 Regular" pitchFamily="2" charset="-127"/>
+              </a:rPr>
+              <a:t>시작</a:t>
+            </a:r>
+          </a:p>
+        </p:txBody>
+      </p:sp>
+      <p:sp>
+        <p:nvSpPr>
+          <p:cNvPr id="7" name="순서도: 수행의 시작/종료 6">
+            <a:extLst>
+              <a:ext uri="{FF2B5EF4-FFF2-40B4-BE49-F238E27FC236}">
+                <a16:creationId xmlns:a16="http://schemas.microsoft.com/office/drawing/2014/main" id="{73FD94D6-0249-0775-A38C-053486A7B11B}"/>
+              </a:ext>
+            </a:extLst>
+          </p:cNvPr>
+          <p:cNvSpPr/>
+          <p:nvPr/>
+        </p:nvSpPr>
+        <p:spPr>
+          <a:xfrm>
+            <a:off x="800100" y="5383638"/>
+            <a:ext cx="1381126" cy="481066"/>
+          </a:xfrm>
+          <a:prstGeom prst="flowChartTerminator">
+            <a:avLst/>
+          </a:prstGeom>
+          <a:solidFill>
+            <a:schemeClr val="accent2"/>
+          </a:solidFill>
+          <a:ln>
+            <a:solidFill>
+              <a:schemeClr val="tx1"/>
+            </a:solidFill>
+          </a:ln>
+        </p:spPr>
+        <p:style>
+          <a:lnRef idx="2">
+            <a:schemeClr val="accent1">
+              <a:shade val="15000"/>
+            </a:schemeClr>
+          </a:lnRef>
+          <a:fillRef idx="1">
+            <a:schemeClr val="accent1"/>
+          </a:fillRef>
+          <a:effectRef idx="0">
+            <a:schemeClr val="accent1"/>
+          </a:effectRef>
+          <a:fontRef idx="minor">
+            <a:schemeClr val="lt1"/>
+          </a:fontRef>
+        </p:style>
+        <p:txBody>
+          <a:bodyPr rtlCol="0" anchor="ctr"/>
+          <a:lstStyle/>
+          <a:p>
+            <a:pPr algn="ctr"/>
+            <a:r>
+              <a:rPr lang="ko-KR" altLang="en-US" sz="1200" dirty="0">
+                <a:solidFill>
+                  <a:schemeClr val="tx1"/>
+                </a:solidFill>
+                <a:latin typeface="페이퍼로지 4 Regular" pitchFamily="2" charset="-127"/>
+                <a:ea typeface="페이퍼로지 4 Regular" pitchFamily="2" charset="-127"/>
+              </a:rPr>
+              <a:t>종료</a:t>
+            </a:r>
+          </a:p>
+        </p:txBody>
+      </p:sp>
+      <p:sp>
+        <p:nvSpPr>
+          <p:cNvPr id="8" name="순서도: 대체 처리 7">
+            <a:extLst>
+              <a:ext uri="{FF2B5EF4-FFF2-40B4-BE49-F238E27FC236}">
+                <a16:creationId xmlns:a16="http://schemas.microsoft.com/office/drawing/2014/main" id="{33D2B022-C16C-CE0E-2E52-3A814D1D0DCB}"/>
+              </a:ext>
+            </a:extLst>
+          </p:cNvPr>
+          <p:cNvSpPr/>
+          <p:nvPr/>
+        </p:nvSpPr>
+        <p:spPr>
+          <a:xfrm>
+            <a:off x="800100" y="1986016"/>
+            <a:ext cx="1381126" cy="481066"/>
+          </a:xfrm>
+          <a:prstGeom prst="flowChartAlternateProcess">
+            <a:avLst/>
+          </a:prstGeom>
+          <a:noFill/>
+          <a:ln>
+            <a:solidFill>
+              <a:schemeClr val="tx1"/>
+            </a:solidFill>
+          </a:ln>
+        </p:spPr>
+        <p:style>
+          <a:lnRef idx="2">
+            <a:schemeClr val="accent1">
+              <a:shade val="15000"/>
+            </a:schemeClr>
+          </a:lnRef>
+          <a:fillRef idx="1">
+            <a:schemeClr val="accent1"/>
+          </a:fillRef>
+          <a:effectRef idx="0">
+            <a:schemeClr val="accent1"/>
+          </a:effectRef>
+          <a:fontRef idx="minor">
+            <a:schemeClr val="lt1"/>
+          </a:fontRef>
+        </p:style>
+        <p:txBody>
+          <a:bodyPr rtlCol="0" anchor="ctr"/>
+          <a:lstStyle/>
+          <a:p>
+            <a:pPr algn="ctr"/>
+            <a:endParaRPr lang="ko-KR" altLang="en-US" sz="1200" dirty="0">
+              <a:solidFill>
+                <a:schemeClr val="tx1"/>
+              </a:solidFill>
+              <a:latin typeface="페이퍼로지 4 Regular" pitchFamily="2" charset="-127"/>
+              <a:ea typeface="페이퍼로지 4 Regular" pitchFamily="2" charset="-127"/>
+            </a:endParaRPr>
+          </a:p>
+        </p:txBody>
+      </p:sp>
+    </p:spTree>
+    <p:extLst>
+      <p:ext uri="{BB962C8B-B14F-4D97-AF65-F5344CB8AC3E}">
+        <p14:creationId xmlns:p14="http://schemas.microsoft.com/office/powerpoint/2010/main" val="4129004308"/>
+      </p:ext>
+    </p:extLst>
+  </p:cSld>
+  <p:clrMapOvr>
+    <a:masterClrMapping/>
+  </p:clrMapOvr>
+</p:sld>
+</file>
+
+<file path=ppt/slides/slide12.xml><?xml version="1.0" encoding="utf-8"?>
+<p:sld xmlns:a="http://schemas.openxmlformats.org/drawingml/2006/main" xmlns:r="http://schemas.openxmlformats.org/officeDocument/2006/relationships" xmlns:p="http://schemas.openxmlformats.org/presentationml/2006/main">
+  <p:cSld>
+    <p:spTree>
+      <p:nvGrpSpPr>
+        <p:cNvPr id="1" name="">
+          <a:extLst>
+            <a:ext uri="{FF2B5EF4-FFF2-40B4-BE49-F238E27FC236}">
+              <a16:creationId xmlns:a16="http://schemas.microsoft.com/office/drawing/2014/main" id="{A0E33357-52AD-28BE-436F-4EBAF1340D43}"/>
+            </a:ext>
+          </a:extLst>
+        </p:cNvPr>
+        <p:cNvGrpSpPr/>
+        <p:nvPr/>
+      </p:nvGrpSpPr>
+      <p:grpSpPr>
+        <a:xfrm>
+          <a:off x="0" y="0"/>
+          <a:ext cx="0" cy="0"/>
+          <a:chOff x="0" y="0"/>
+          <a:chExt cx="0" cy="0"/>
+        </a:xfrm>
+      </p:grpSpPr>
+      <p:sp>
+        <p:nvSpPr>
+          <p:cNvPr id="3" name="사각형: 잘린 대각선 방향 모서리 2">
+            <a:extLst>
+              <a:ext uri="{FF2B5EF4-FFF2-40B4-BE49-F238E27FC236}">
+                <a16:creationId xmlns:a16="http://schemas.microsoft.com/office/drawing/2014/main" id="{350099B8-40A1-D210-A099-197E99A51AFC}"/>
+              </a:ext>
+            </a:extLst>
+          </p:cNvPr>
+          <p:cNvSpPr/>
+          <p:nvPr/>
+        </p:nvSpPr>
+        <p:spPr>
+          <a:xfrm>
+            <a:off x="212436" y="230909"/>
+            <a:ext cx="11767127" cy="6437746"/>
+          </a:xfrm>
+          <a:prstGeom prst="snip2DiagRect">
+            <a:avLst>
+              <a:gd name="adj1" fmla="val 0"/>
+              <a:gd name="adj2" fmla="val 6911"/>
+            </a:avLst>
+          </a:prstGeom>
+          <a:noFill/>
+          <a:ln w="53975">
+            <a:solidFill>
+              <a:schemeClr val="tx1"/>
+            </a:solidFill>
+          </a:ln>
+        </p:spPr>
+        <p:style>
+          <a:lnRef idx="2">
+            <a:schemeClr val="accent1">
+              <a:shade val="15000"/>
+            </a:schemeClr>
+          </a:lnRef>
+          <a:fillRef idx="1">
+            <a:schemeClr val="accent1"/>
+          </a:fillRef>
+          <a:effectRef idx="0">
+            <a:schemeClr val="accent1"/>
+          </a:effectRef>
+          <a:fontRef idx="minor">
+            <a:schemeClr val="lt1"/>
+          </a:fontRef>
+        </p:style>
+        <p:txBody>
+          <a:bodyPr rtlCol="0" anchor="ctr"/>
+          <a:lstStyle/>
+          <a:p>
+            <a:pPr algn="ctr"/>
+            <a:endParaRPr lang="ko-KR" altLang="en-US"/>
+          </a:p>
+        </p:txBody>
+      </p:sp>
+      <p:sp>
+        <p:nvSpPr>
+          <p:cNvPr id="4" name="직사각형 3">
+            <a:extLst>
+              <a:ext uri="{FF2B5EF4-FFF2-40B4-BE49-F238E27FC236}">
+                <a16:creationId xmlns:a16="http://schemas.microsoft.com/office/drawing/2014/main" id="{B20EC54D-3336-8BAF-116A-9E82F9061ECB}"/>
+              </a:ext>
+            </a:extLst>
+          </p:cNvPr>
+          <p:cNvSpPr/>
+          <p:nvPr/>
+        </p:nvSpPr>
+        <p:spPr>
+          <a:xfrm>
+            <a:off x="800100" y="491836"/>
+            <a:ext cx="10672401" cy="432089"/>
+          </a:xfrm>
+          <a:prstGeom prst="rect">
+            <a:avLst/>
+          </a:prstGeom>
+          <a:noFill/>
+          <a:ln>
+            <a:noFill/>
+          </a:ln>
+        </p:spPr>
+        <p:style>
+          <a:lnRef idx="2">
+            <a:schemeClr val="accent1">
+              <a:shade val="15000"/>
+            </a:schemeClr>
+          </a:lnRef>
+          <a:fillRef idx="1">
+            <a:schemeClr val="accent1"/>
+          </a:fillRef>
+          <a:effectRef idx="0">
+            <a:schemeClr val="accent1"/>
+          </a:effectRef>
+          <a:fontRef idx="minor">
+            <a:schemeClr val="lt1"/>
+          </a:fontRef>
+        </p:style>
+        <p:txBody>
+          <a:bodyPr rtlCol="0" anchor="ctr"/>
+          <a:lstStyle/>
+          <a:p>
+            <a:pPr algn="l"/>
+            <a:r>
+              <a:rPr lang="ko-KR" altLang="en-US" dirty="0">
+                <a:solidFill>
+                  <a:schemeClr val="tx1"/>
+                </a:solidFill>
+                <a:latin typeface="페이퍼로지 6 SemiBold" pitchFamily="2" charset="-127"/>
+                <a:ea typeface="페이퍼로지 6 SemiBold" pitchFamily="2" charset="-127"/>
+                <a:cs typeface="Pretendard Medium" panose="02000603000000020004" pitchFamily="2" charset="-127"/>
+              </a:rPr>
+              <a:t>스타트 씬 흐름도</a:t>
+            </a:r>
+          </a:p>
+        </p:txBody>
+      </p:sp>
+      <p:sp>
+        <p:nvSpPr>
+          <p:cNvPr id="5" name="다이아몬드 4">
+            <a:extLst>
+              <a:ext uri="{FF2B5EF4-FFF2-40B4-BE49-F238E27FC236}">
+                <a16:creationId xmlns:a16="http://schemas.microsoft.com/office/drawing/2014/main" id="{A7CA136C-7548-659B-D6C5-2A55BB188594}"/>
+              </a:ext>
+            </a:extLst>
+          </p:cNvPr>
+          <p:cNvSpPr/>
+          <p:nvPr/>
+        </p:nvSpPr>
+        <p:spPr>
+          <a:xfrm>
+            <a:off x="430718" y="563491"/>
+            <a:ext cx="288780" cy="288780"/>
+          </a:xfrm>
+          <a:prstGeom prst="diamond">
+            <a:avLst/>
+          </a:prstGeom>
+          <a:noFill/>
+          <a:ln w="19050">
+            <a:solidFill>
+              <a:schemeClr val="tx1"/>
+            </a:solidFill>
+          </a:ln>
+        </p:spPr>
+        <p:style>
+          <a:lnRef idx="2">
+            <a:schemeClr val="accent1">
+              <a:shade val="15000"/>
+            </a:schemeClr>
+          </a:lnRef>
+          <a:fillRef idx="1">
+            <a:schemeClr val="accent1"/>
+          </a:fillRef>
+          <a:effectRef idx="0">
+            <a:schemeClr val="accent1"/>
+          </a:effectRef>
+          <a:fontRef idx="minor">
+            <a:schemeClr val="lt1"/>
+          </a:fontRef>
+        </p:style>
+        <p:txBody>
+          <a:bodyPr rtlCol="0" anchor="ctr"/>
+          <a:lstStyle/>
+          <a:p>
+            <a:pPr algn="l"/>
+            <a:endParaRPr lang="ko-KR" altLang="en-US" sz="1600" dirty="0">
+              <a:solidFill>
+                <a:schemeClr val="tx1"/>
+              </a:solidFill>
+              <a:latin typeface="페이퍼로지 5 Medium" pitchFamily="2" charset="-127"/>
+              <a:ea typeface="페이퍼로지 5 Medium" pitchFamily="2" charset="-127"/>
+              <a:cs typeface="Pretendard Medium" panose="02000603000000020004" pitchFamily="2" charset="-127"/>
+            </a:endParaRPr>
+          </a:p>
+        </p:txBody>
+      </p:sp>
+      <p:sp>
+        <p:nvSpPr>
+          <p:cNvPr id="6" name="순서도: 수행의 시작/종료 5">
+            <a:extLst>
+              <a:ext uri="{FF2B5EF4-FFF2-40B4-BE49-F238E27FC236}">
+                <a16:creationId xmlns:a16="http://schemas.microsoft.com/office/drawing/2014/main" id="{B8BC7506-4C56-CED5-432C-62FA142F3F06}"/>
+              </a:ext>
+            </a:extLst>
+          </p:cNvPr>
+          <p:cNvSpPr/>
+          <p:nvPr/>
+        </p:nvSpPr>
+        <p:spPr>
+          <a:xfrm>
+            <a:off x="800100" y="1233829"/>
+            <a:ext cx="1381126" cy="481066"/>
+          </a:xfrm>
+          <a:prstGeom prst="flowChartTerminator">
+            <a:avLst/>
+          </a:prstGeom>
+          <a:solidFill>
+            <a:schemeClr val="accent2"/>
+          </a:solidFill>
+          <a:ln>
+            <a:solidFill>
+              <a:schemeClr val="tx1"/>
+            </a:solidFill>
+          </a:ln>
+        </p:spPr>
+        <p:style>
+          <a:lnRef idx="2">
+            <a:schemeClr val="accent1">
+              <a:shade val="15000"/>
+            </a:schemeClr>
+          </a:lnRef>
+          <a:fillRef idx="1">
+            <a:schemeClr val="accent1"/>
+          </a:fillRef>
+          <a:effectRef idx="0">
+            <a:schemeClr val="accent1"/>
+          </a:effectRef>
+          <a:fontRef idx="minor">
+            <a:schemeClr val="lt1"/>
+          </a:fontRef>
+        </p:style>
+        <p:txBody>
+          <a:bodyPr rtlCol="0" anchor="ctr"/>
+          <a:lstStyle/>
+          <a:p>
+            <a:pPr algn="ctr"/>
+            <a:r>
+              <a:rPr lang="ko-KR" altLang="en-US" sz="1200" dirty="0">
+                <a:solidFill>
+                  <a:schemeClr val="tx1"/>
+                </a:solidFill>
+                <a:latin typeface="페이퍼로지 4 Regular" pitchFamily="2" charset="-127"/>
+                <a:ea typeface="페이퍼로지 4 Regular" pitchFamily="2" charset="-127"/>
+              </a:rPr>
+              <a:t>시작</a:t>
+            </a:r>
+          </a:p>
+        </p:txBody>
+      </p:sp>
+      <p:sp>
+        <p:nvSpPr>
+          <p:cNvPr id="7" name="순서도: 수행의 시작/종료 6">
+            <a:extLst>
+              <a:ext uri="{FF2B5EF4-FFF2-40B4-BE49-F238E27FC236}">
+                <a16:creationId xmlns:a16="http://schemas.microsoft.com/office/drawing/2014/main" id="{861D3F02-D7FD-C4F6-AC03-22493E63CE5E}"/>
+              </a:ext>
+            </a:extLst>
+          </p:cNvPr>
+          <p:cNvSpPr/>
+          <p:nvPr/>
+        </p:nvSpPr>
+        <p:spPr>
+          <a:xfrm>
+            <a:off x="800100" y="5383638"/>
+            <a:ext cx="1381126" cy="481066"/>
+          </a:xfrm>
+          <a:prstGeom prst="flowChartTerminator">
+            <a:avLst/>
+          </a:prstGeom>
+          <a:solidFill>
+            <a:schemeClr val="accent2"/>
+          </a:solidFill>
+          <a:ln>
+            <a:solidFill>
+              <a:schemeClr val="tx1"/>
+            </a:solidFill>
+          </a:ln>
+        </p:spPr>
+        <p:style>
+          <a:lnRef idx="2">
+            <a:schemeClr val="accent1">
+              <a:shade val="15000"/>
+            </a:schemeClr>
+          </a:lnRef>
+          <a:fillRef idx="1">
+            <a:schemeClr val="accent1"/>
+          </a:fillRef>
+          <a:effectRef idx="0">
+            <a:schemeClr val="accent1"/>
+          </a:effectRef>
+          <a:fontRef idx="minor">
+            <a:schemeClr val="lt1"/>
+          </a:fontRef>
+        </p:style>
+        <p:txBody>
+          <a:bodyPr rtlCol="0" anchor="ctr"/>
+          <a:lstStyle/>
+          <a:p>
+            <a:pPr algn="ctr"/>
+            <a:r>
+              <a:rPr lang="ko-KR" altLang="en-US" sz="1200" dirty="0">
+                <a:solidFill>
+                  <a:schemeClr val="tx1"/>
+                </a:solidFill>
+                <a:latin typeface="페이퍼로지 4 Regular" pitchFamily="2" charset="-127"/>
+                <a:ea typeface="페이퍼로지 4 Regular" pitchFamily="2" charset="-127"/>
+              </a:rPr>
+              <a:t>종료</a:t>
+            </a:r>
+          </a:p>
+        </p:txBody>
+      </p:sp>
+      <p:sp>
+        <p:nvSpPr>
+          <p:cNvPr id="8" name="순서도: 대체 처리 7">
+            <a:extLst>
+              <a:ext uri="{FF2B5EF4-FFF2-40B4-BE49-F238E27FC236}">
+                <a16:creationId xmlns:a16="http://schemas.microsoft.com/office/drawing/2014/main" id="{70939FC2-CEC8-BDF8-7F75-C3835A475AC1}"/>
+              </a:ext>
+            </a:extLst>
+          </p:cNvPr>
+          <p:cNvSpPr/>
+          <p:nvPr/>
+        </p:nvSpPr>
+        <p:spPr>
+          <a:xfrm>
+            <a:off x="800100" y="1986016"/>
+            <a:ext cx="1381126" cy="481066"/>
+          </a:xfrm>
+          <a:prstGeom prst="flowChartAlternateProcess">
+            <a:avLst/>
+          </a:prstGeom>
+          <a:noFill/>
+          <a:ln>
+            <a:solidFill>
+              <a:schemeClr val="tx1"/>
+            </a:solidFill>
+          </a:ln>
+        </p:spPr>
+        <p:style>
+          <a:lnRef idx="2">
+            <a:schemeClr val="accent1">
+              <a:shade val="15000"/>
+            </a:schemeClr>
+          </a:lnRef>
+          <a:fillRef idx="1">
+            <a:schemeClr val="accent1"/>
+          </a:fillRef>
+          <a:effectRef idx="0">
+            <a:schemeClr val="accent1"/>
+          </a:effectRef>
+          <a:fontRef idx="minor">
+            <a:schemeClr val="lt1"/>
+          </a:fontRef>
+        </p:style>
+        <p:txBody>
+          <a:bodyPr rtlCol="0" anchor="ctr"/>
+          <a:lstStyle/>
+          <a:p>
+            <a:pPr algn="ctr"/>
+            <a:endParaRPr lang="ko-KR" altLang="en-US" sz="1200" dirty="0">
+              <a:solidFill>
+                <a:schemeClr val="tx1"/>
+              </a:solidFill>
+              <a:latin typeface="페이퍼로지 4 Regular" pitchFamily="2" charset="-127"/>
+              <a:ea typeface="페이퍼로지 4 Regular" pitchFamily="2" charset="-127"/>
+            </a:endParaRPr>
+          </a:p>
+        </p:txBody>
+      </p:sp>
+    </p:spTree>
+    <p:extLst>
+      <p:ext uri="{BB962C8B-B14F-4D97-AF65-F5344CB8AC3E}">
+        <p14:creationId xmlns:p14="http://schemas.microsoft.com/office/powerpoint/2010/main" val="2395774637"/>
+      </p:ext>
+    </p:extLst>
+  </p:cSld>
+  <p:clrMapOvr>
+    <a:masterClrMapping/>
+  </p:clrMapOvr>
+</p:sld>
+</file>
+
+<file path=ppt/slides/slide13.xml><?xml version="1.0" encoding="utf-8"?>
+<p:sld xmlns:a="http://schemas.openxmlformats.org/drawingml/2006/main" xmlns:r="http://schemas.openxmlformats.org/officeDocument/2006/relationships" xmlns:p="http://schemas.openxmlformats.org/presentationml/2006/main">
+  <p:cSld>
+    <p:spTree>
+      <p:nvGrpSpPr>
+        <p:cNvPr id="1" name="">
+          <a:extLst>
+            <a:ext uri="{FF2B5EF4-FFF2-40B4-BE49-F238E27FC236}">
+              <a16:creationId xmlns:a16="http://schemas.microsoft.com/office/drawing/2014/main" id="{3B804C97-A3AF-30D7-0328-A2239B8C37EA}"/>
+            </a:ext>
+          </a:extLst>
+        </p:cNvPr>
+        <p:cNvGrpSpPr/>
+        <p:nvPr/>
+      </p:nvGrpSpPr>
+      <p:grpSpPr>
+        <a:xfrm>
+          <a:off x="0" y="0"/>
+          <a:ext cx="0" cy="0"/>
+          <a:chOff x="0" y="0"/>
+          <a:chExt cx="0" cy="0"/>
+        </a:xfrm>
+      </p:grpSpPr>
+      <p:sp>
+        <p:nvSpPr>
+          <p:cNvPr id="3" name="사각형: 잘린 대각선 방향 모서리 2">
+            <a:extLst>
+              <a:ext uri="{FF2B5EF4-FFF2-40B4-BE49-F238E27FC236}">
+                <a16:creationId xmlns:a16="http://schemas.microsoft.com/office/drawing/2014/main" id="{7E2C8684-B2D6-F890-7BA8-89EBA867ED74}"/>
+              </a:ext>
+            </a:extLst>
+          </p:cNvPr>
+          <p:cNvSpPr/>
+          <p:nvPr/>
+        </p:nvSpPr>
+        <p:spPr>
+          <a:xfrm>
+            <a:off x="212436" y="230909"/>
+            <a:ext cx="11767127" cy="6437746"/>
+          </a:xfrm>
+          <a:prstGeom prst="snip2DiagRect">
+            <a:avLst>
+              <a:gd name="adj1" fmla="val 0"/>
+              <a:gd name="adj2" fmla="val 6911"/>
+            </a:avLst>
+          </a:prstGeom>
+          <a:noFill/>
+          <a:ln w="53975">
+            <a:solidFill>
+              <a:schemeClr val="tx1"/>
+            </a:solidFill>
+          </a:ln>
+        </p:spPr>
+        <p:style>
+          <a:lnRef idx="2">
+            <a:schemeClr val="accent1">
+              <a:shade val="15000"/>
+            </a:schemeClr>
+          </a:lnRef>
+          <a:fillRef idx="1">
+            <a:schemeClr val="accent1"/>
+          </a:fillRef>
+          <a:effectRef idx="0">
+            <a:schemeClr val="accent1"/>
+          </a:effectRef>
+          <a:fontRef idx="minor">
+            <a:schemeClr val="lt1"/>
+          </a:fontRef>
+        </p:style>
+        <p:txBody>
+          <a:bodyPr rtlCol="0" anchor="ctr"/>
+          <a:lstStyle/>
+          <a:p>
+            <a:pPr algn="ctr"/>
+            <a:endParaRPr lang="ko-KR" altLang="en-US"/>
+          </a:p>
+        </p:txBody>
+      </p:sp>
+      <p:sp>
+        <p:nvSpPr>
+          <p:cNvPr id="4" name="직사각형 3">
+            <a:extLst>
+              <a:ext uri="{FF2B5EF4-FFF2-40B4-BE49-F238E27FC236}">
+                <a16:creationId xmlns:a16="http://schemas.microsoft.com/office/drawing/2014/main" id="{583BFCF2-3F77-A423-7023-D3E278935AE1}"/>
+              </a:ext>
+            </a:extLst>
+          </p:cNvPr>
+          <p:cNvSpPr/>
+          <p:nvPr/>
+        </p:nvSpPr>
+        <p:spPr>
+          <a:xfrm>
+            <a:off x="800100" y="491836"/>
+            <a:ext cx="10672401" cy="432089"/>
+          </a:xfrm>
+          <a:prstGeom prst="rect">
+            <a:avLst/>
+          </a:prstGeom>
+          <a:noFill/>
+          <a:ln>
+            <a:noFill/>
+          </a:ln>
+        </p:spPr>
+        <p:style>
+          <a:lnRef idx="2">
+            <a:schemeClr val="accent1">
+              <a:shade val="15000"/>
+            </a:schemeClr>
+          </a:lnRef>
+          <a:fillRef idx="1">
+            <a:schemeClr val="accent1"/>
+          </a:fillRef>
+          <a:effectRef idx="0">
+            <a:schemeClr val="accent1"/>
+          </a:effectRef>
+          <a:fontRef idx="minor">
+            <a:schemeClr val="lt1"/>
+          </a:fontRef>
+        </p:style>
+        <p:txBody>
+          <a:bodyPr rtlCol="0" anchor="ctr"/>
+          <a:lstStyle/>
+          <a:p>
+            <a:pPr algn="l"/>
+            <a:r>
+              <a:rPr lang="ko-KR" altLang="en-US" dirty="0">
+                <a:solidFill>
+                  <a:schemeClr val="tx1"/>
+                </a:solidFill>
+                <a:latin typeface="페이퍼로지 6 SemiBold" pitchFamily="2" charset="-127"/>
+                <a:ea typeface="페이퍼로지 6 SemiBold" pitchFamily="2" charset="-127"/>
+                <a:cs typeface="Pretendard Medium" panose="02000603000000020004" pitchFamily="2" charset="-127"/>
+              </a:rPr>
+              <a:t>스타트 씬 흐름도</a:t>
+            </a:r>
+          </a:p>
+        </p:txBody>
+      </p:sp>
+      <p:sp>
+        <p:nvSpPr>
+          <p:cNvPr id="5" name="다이아몬드 4">
+            <a:extLst>
+              <a:ext uri="{FF2B5EF4-FFF2-40B4-BE49-F238E27FC236}">
+                <a16:creationId xmlns:a16="http://schemas.microsoft.com/office/drawing/2014/main" id="{92BC77C1-B029-996C-76F4-51098A5C2244}"/>
+              </a:ext>
+            </a:extLst>
+          </p:cNvPr>
+          <p:cNvSpPr/>
+          <p:nvPr/>
+        </p:nvSpPr>
+        <p:spPr>
+          <a:xfrm>
+            <a:off x="430718" y="563491"/>
+            <a:ext cx="288780" cy="288780"/>
+          </a:xfrm>
+          <a:prstGeom prst="diamond">
+            <a:avLst/>
+          </a:prstGeom>
+          <a:noFill/>
+          <a:ln w="19050">
+            <a:solidFill>
+              <a:schemeClr val="tx1"/>
+            </a:solidFill>
+          </a:ln>
+        </p:spPr>
+        <p:style>
+          <a:lnRef idx="2">
+            <a:schemeClr val="accent1">
+              <a:shade val="15000"/>
+            </a:schemeClr>
+          </a:lnRef>
+          <a:fillRef idx="1">
+            <a:schemeClr val="accent1"/>
+          </a:fillRef>
+          <a:effectRef idx="0">
+            <a:schemeClr val="accent1"/>
+          </a:effectRef>
+          <a:fontRef idx="minor">
+            <a:schemeClr val="lt1"/>
+          </a:fontRef>
+        </p:style>
+        <p:txBody>
+          <a:bodyPr rtlCol="0" anchor="ctr"/>
+          <a:lstStyle/>
+          <a:p>
+            <a:pPr algn="l"/>
+            <a:endParaRPr lang="ko-KR" altLang="en-US" sz="1600" dirty="0">
+              <a:solidFill>
+                <a:schemeClr val="tx1"/>
+              </a:solidFill>
+              <a:latin typeface="페이퍼로지 5 Medium" pitchFamily="2" charset="-127"/>
+              <a:ea typeface="페이퍼로지 5 Medium" pitchFamily="2" charset="-127"/>
+              <a:cs typeface="Pretendard Medium" panose="02000603000000020004" pitchFamily="2" charset="-127"/>
+            </a:endParaRPr>
+          </a:p>
+        </p:txBody>
+      </p:sp>
+      <p:sp>
+        <p:nvSpPr>
+          <p:cNvPr id="6" name="순서도: 수행의 시작/종료 5">
+            <a:extLst>
+              <a:ext uri="{FF2B5EF4-FFF2-40B4-BE49-F238E27FC236}">
+                <a16:creationId xmlns:a16="http://schemas.microsoft.com/office/drawing/2014/main" id="{DE4C4985-2194-4137-37F0-D77B3C868EF2}"/>
+              </a:ext>
+            </a:extLst>
+          </p:cNvPr>
+          <p:cNvSpPr/>
+          <p:nvPr/>
+        </p:nvSpPr>
+        <p:spPr>
+          <a:xfrm>
+            <a:off x="800100" y="1233829"/>
+            <a:ext cx="1381126" cy="481066"/>
+          </a:xfrm>
+          <a:prstGeom prst="flowChartTerminator">
+            <a:avLst/>
+          </a:prstGeom>
+          <a:solidFill>
+            <a:schemeClr val="accent2"/>
+          </a:solidFill>
+          <a:ln>
+            <a:solidFill>
+              <a:schemeClr val="tx1"/>
+            </a:solidFill>
+          </a:ln>
+        </p:spPr>
+        <p:style>
+          <a:lnRef idx="2">
+            <a:schemeClr val="accent1">
+              <a:shade val="15000"/>
+            </a:schemeClr>
+          </a:lnRef>
+          <a:fillRef idx="1">
+            <a:schemeClr val="accent1"/>
+          </a:fillRef>
+          <a:effectRef idx="0">
+            <a:schemeClr val="accent1"/>
+          </a:effectRef>
+          <a:fontRef idx="minor">
+            <a:schemeClr val="lt1"/>
+          </a:fontRef>
+        </p:style>
+        <p:txBody>
+          <a:bodyPr rtlCol="0" anchor="ctr"/>
+          <a:lstStyle/>
+          <a:p>
+            <a:pPr algn="ctr"/>
+            <a:r>
+              <a:rPr lang="ko-KR" altLang="en-US" sz="1200" dirty="0">
+                <a:solidFill>
+                  <a:schemeClr val="tx1"/>
+                </a:solidFill>
+                <a:latin typeface="페이퍼로지 4 Regular" pitchFamily="2" charset="-127"/>
+                <a:ea typeface="페이퍼로지 4 Regular" pitchFamily="2" charset="-127"/>
+              </a:rPr>
+              <a:t>시작</a:t>
+            </a:r>
+          </a:p>
+        </p:txBody>
+      </p:sp>
+      <p:sp>
+        <p:nvSpPr>
+          <p:cNvPr id="7" name="순서도: 수행의 시작/종료 6">
+            <a:extLst>
+              <a:ext uri="{FF2B5EF4-FFF2-40B4-BE49-F238E27FC236}">
+                <a16:creationId xmlns:a16="http://schemas.microsoft.com/office/drawing/2014/main" id="{4C539B25-06D3-ECF3-7533-413AB58E2149}"/>
+              </a:ext>
+            </a:extLst>
+          </p:cNvPr>
+          <p:cNvSpPr/>
+          <p:nvPr/>
+        </p:nvSpPr>
+        <p:spPr>
+          <a:xfrm>
+            <a:off x="800100" y="5383638"/>
+            <a:ext cx="1381126" cy="481066"/>
+          </a:xfrm>
+          <a:prstGeom prst="flowChartTerminator">
+            <a:avLst/>
+          </a:prstGeom>
+          <a:solidFill>
+            <a:schemeClr val="accent2"/>
+          </a:solidFill>
+          <a:ln>
+            <a:solidFill>
+              <a:schemeClr val="tx1"/>
+            </a:solidFill>
+          </a:ln>
+        </p:spPr>
+        <p:style>
+          <a:lnRef idx="2">
+            <a:schemeClr val="accent1">
+              <a:shade val="15000"/>
+            </a:schemeClr>
+          </a:lnRef>
+          <a:fillRef idx="1">
+            <a:schemeClr val="accent1"/>
+          </a:fillRef>
+          <a:effectRef idx="0">
+            <a:schemeClr val="accent1"/>
+          </a:effectRef>
+          <a:fontRef idx="minor">
+            <a:schemeClr val="lt1"/>
+          </a:fontRef>
+        </p:style>
+        <p:txBody>
+          <a:bodyPr rtlCol="0" anchor="ctr"/>
+          <a:lstStyle/>
+          <a:p>
+            <a:pPr algn="ctr"/>
+            <a:r>
+              <a:rPr lang="ko-KR" altLang="en-US" sz="1200" dirty="0">
+                <a:solidFill>
+                  <a:schemeClr val="tx1"/>
+                </a:solidFill>
+                <a:latin typeface="페이퍼로지 4 Regular" pitchFamily="2" charset="-127"/>
+                <a:ea typeface="페이퍼로지 4 Regular" pitchFamily="2" charset="-127"/>
+              </a:rPr>
+              <a:t>종료</a:t>
+            </a:r>
+          </a:p>
+        </p:txBody>
+      </p:sp>
+      <p:sp>
+        <p:nvSpPr>
+          <p:cNvPr id="8" name="순서도: 대체 처리 7">
+            <a:extLst>
+              <a:ext uri="{FF2B5EF4-FFF2-40B4-BE49-F238E27FC236}">
+                <a16:creationId xmlns:a16="http://schemas.microsoft.com/office/drawing/2014/main" id="{B84B4200-C403-878C-36AF-6BB8ED5E2C85}"/>
+              </a:ext>
+            </a:extLst>
+          </p:cNvPr>
+          <p:cNvSpPr/>
+          <p:nvPr/>
+        </p:nvSpPr>
+        <p:spPr>
+          <a:xfrm>
+            <a:off x="800100" y="1986016"/>
+            <a:ext cx="1381126" cy="481066"/>
+          </a:xfrm>
+          <a:prstGeom prst="flowChartAlternateProcess">
+            <a:avLst/>
+          </a:prstGeom>
+          <a:noFill/>
+          <a:ln>
+            <a:solidFill>
+              <a:schemeClr val="tx1"/>
+            </a:solidFill>
+          </a:ln>
+        </p:spPr>
+        <p:style>
+          <a:lnRef idx="2">
+            <a:schemeClr val="accent1">
+              <a:shade val="15000"/>
+            </a:schemeClr>
+          </a:lnRef>
+          <a:fillRef idx="1">
+            <a:schemeClr val="accent1"/>
+          </a:fillRef>
+          <a:effectRef idx="0">
+            <a:schemeClr val="accent1"/>
+          </a:effectRef>
+          <a:fontRef idx="minor">
+            <a:schemeClr val="lt1"/>
+          </a:fontRef>
+        </p:style>
+        <p:txBody>
+          <a:bodyPr rtlCol="0" anchor="ctr"/>
+          <a:lstStyle/>
+          <a:p>
+            <a:pPr algn="ctr"/>
+            <a:endParaRPr lang="ko-KR" altLang="en-US" sz="1200" dirty="0">
+              <a:solidFill>
+                <a:schemeClr val="tx1"/>
+              </a:solidFill>
+              <a:latin typeface="페이퍼로지 4 Regular" pitchFamily="2" charset="-127"/>
+              <a:ea typeface="페이퍼로지 4 Regular" pitchFamily="2" charset="-127"/>
+            </a:endParaRPr>
+          </a:p>
+        </p:txBody>
+      </p:sp>
+    </p:spTree>
+    <p:extLst>
+      <p:ext uri="{BB962C8B-B14F-4D97-AF65-F5344CB8AC3E}">
+        <p14:creationId xmlns:p14="http://schemas.microsoft.com/office/powerpoint/2010/main" val="2268915777"/>
+      </p:ext>
+    </p:extLst>
+  </p:cSld>
+  <p:clrMapOvr>
+    <a:masterClrMapping/>
+  </p:clrMapOvr>
+</p:sld>
+</file>
+
 <file path=ppt/slides/slide2.xml><?xml version="1.0" encoding="utf-8"?>
 <p:sld xmlns:a="http://schemas.openxmlformats.org/drawingml/2006/main" xmlns:r="http://schemas.openxmlformats.org/officeDocument/2006/relationships" xmlns:p="http://schemas.openxmlformats.org/presentationml/2006/main">
   <p:cSld>
@@ -7442,7 +9027,7 @@
               <a:t>각 씬 별로 흐름을 정리하는 것을 목표로 작성되었음</a:t>
             </a:r>
             <a:r>
-              <a:rPr lang="en-US" altLang="ko-KR" sz="1600">
+              <a:rPr lang="en-US" altLang="ko-KR" sz="1600" dirty="0">
                 <a:solidFill>
                   <a:schemeClr val="tx1"/>
                 </a:solidFill>
@@ -7451,13 +9036,6 @@
               </a:rPr>
               <a:t>.</a:t>
             </a:r>
-            <a:endParaRPr lang="en-US" altLang="ko-KR" sz="1600" dirty="0">
-              <a:solidFill>
-                <a:schemeClr val="tx1"/>
-              </a:solidFill>
-              <a:latin typeface="페이퍼로지 4 Regular" pitchFamily="2" charset="-127"/>
-              <a:ea typeface="페이퍼로지 4 Regular" pitchFamily="2" charset="-127"/>
-            </a:endParaRPr>
           </a:p>
         </p:txBody>
       </p:sp>
@@ -7473,7 +9051,13 @@
           <p:cNvGraphicFramePr>
             <a:graphicFrameLocks noGrp="1"/>
           </p:cNvGraphicFramePr>
-          <p:nvPr/>
+          <p:nvPr>
+            <p:extLst>
+              <p:ext uri="{D42A27DB-BD31-4B8C-83A1-F6EECF244321}">
+                <p14:modId xmlns:p14="http://schemas.microsoft.com/office/powerpoint/2010/main" val="12092560"/>
+              </p:ext>
+            </p:extLst>
+          </p:nvPr>
         </p:nvGraphicFramePr>
         <p:xfrm>
           <a:off x="485775" y="4320554"/>
@@ -7631,7 +9215,7 @@
                           <a:latin typeface="페이퍼로지 4 Regular" pitchFamily="2" charset="-127"/>
                           <a:ea typeface="페이퍼로지 4 Regular" pitchFamily="2" charset="-127"/>
                         </a:rPr>
-                        <a:t>2025-06-19</a:t>
+                        <a:t>2025-06-23</a:t>
                       </a:r>
                       <a:endParaRPr lang="ko-KR" altLang="en-US" sz="1200" dirty="0">
                         <a:solidFill>
@@ -7712,7 +9296,7 @@
                           <a:latin typeface="페이퍼로지 4 Regular" pitchFamily="2" charset="-127"/>
                           <a:ea typeface="페이퍼로지 4 Regular" pitchFamily="2" charset="-127"/>
                         </a:rPr>
-                        <a:t>목차 및 세부 내용 작성</a:t>
+                        <a:t>세부 내용 작성</a:t>
                       </a:r>
                     </a:p>
                   </a:txBody>
@@ -8088,7 +9672,7 @@
         </p:nvSpPr>
         <p:spPr>
           <a:xfrm>
-            <a:off x="800100" y="491836"/>
+            <a:off x="719498" y="491836"/>
             <a:ext cx="10672401" cy="432089"/>
           </a:xfrm>
           <a:prstGeom prst="rect">
@@ -8129,7 +9713,7 @@
                 <a:ea typeface="페이퍼로지 6 SemiBold" pitchFamily="2" charset="-127"/>
                 <a:cs typeface="Pretendard Medium" panose="02000603000000020004" pitchFamily="2" charset="-127"/>
               </a:rPr>
-              <a:t>문서 목적</a:t>
+              <a:t>스타트 씬 흐름도</a:t>
             </a:r>
           </a:p>
         </p:txBody>
@@ -8193,10 +9777,2350 @@
           </a:p>
         </p:txBody>
       </p:sp>
+      <p:sp>
+        <p:nvSpPr>
+          <p:cNvPr id="6" name="순서도: 수행의 시작/종료 5">
+            <a:extLst>
+              <a:ext uri="{FF2B5EF4-FFF2-40B4-BE49-F238E27FC236}">
+                <a16:creationId xmlns:a16="http://schemas.microsoft.com/office/drawing/2014/main" id="{89902D9F-EC59-D113-0F57-F76D6ECB795A}"/>
+              </a:ext>
+            </a:extLst>
+          </p:cNvPr>
+          <p:cNvSpPr/>
+          <p:nvPr/>
+        </p:nvSpPr>
+        <p:spPr>
+          <a:xfrm>
+            <a:off x="800100" y="1233829"/>
+            <a:ext cx="1381126" cy="481066"/>
+          </a:xfrm>
+          <a:prstGeom prst="flowChartTerminator">
+            <a:avLst/>
+          </a:prstGeom>
+          <a:solidFill>
+            <a:schemeClr val="accent2"/>
+          </a:solidFill>
+          <a:ln>
+            <a:solidFill>
+              <a:schemeClr val="tx1"/>
+            </a:solidFill>
+          </a:ln>
+        </p:spPr>
+        <p:style>
+          <a:lnRef idx="2">
+            <a:schemeClr val="accent1">
+              <a:shade val="15000"/>
+            </a:schemeClr>
+          </a:lnRef>
+          <a:fillRef idx="1">
+            <a:schemeClr val="accent1"/>
+          </a:fillRef>
+          <a:effectRef idx="0">
+            <a:schemeClr val="accent1"/>
+          </a:effectRef>
+          <a:fontRef idx="minor">
+            <a:schemeClr val="lt1"/>
+          </a:fontRef>
+        </p:style>
+        <p:txBody>
+          <a:bodyPr rtlCol="0" anchor="ctr"/>
+          <a:lstStyle/>
+          <a:p>
+            <a:pPr algn="ctr"/>
+            <a:r>
+              <a:rPr lang="ko-KR" altLang="en-US" sz="1200" dirty="0">
+                <a:solidFill>
+                  <a:schemeClr val="tx1"/>
+                </a:solidFill>
+                <a:latin typeface="페이퍼로지 4 Regular" pitchFamily="2" charset="-127"/>
+                <a:ea typeface="페이퍼로지 4 Regular" pitchFamily="2" charset="-127"/>
+              </a:rPr>
+              <a:t>시작</a:t>
+            </a:r>
+          </a:p>
+        </p:txBody>
+      </p:sp>
+      <p:sp>
+        <p:nvSpPr>
+          <p:cNvPr id="7" name="순서도: 수행의 시작/종료 6">
+            <a:extLst>
+              <a:ext uri="{FF2B5EF4-FFF2-40B4-BE49-F238E27FC236}">
+                <a16:creationId xmlns:a16="http://schemas.microsoft.com/office/drawing/2014/main" id="{23A24A78-E5C3-F0AE-6A24-3CCC5D5D521F}"/>
+              </a:ext>
+            </a:extLst>
+          </p:cNvPr>
+          <p:cNvSpPr/>
+          <p:nvPr/>
+        </p:nvSpPr>
+        <p:spPr>
+          <a:xfrm>
+            <a:off x="800100" y="5555088"/>
+            <a:ext cx="1381126" cy="481066"/>
+          </a:xfrm>
+          <a:prstGeom prst="flowChartTerminator">
+            <a:avLst/>
+          </a:prstGeom>
+          <a:solidFill>
+            <a:schemeClr val="accent2"/>
+          </a:solidFill>
+          <a:ln>
+            <a:solidFill>
+              <a:schemeClr val="tx1"/>
+            </a:solidFill>
+          </a:ln>
+        </p:spPr>
+        <p:style>
+          <a:lnRef idx="2">
+            <a:schemeClr val="accent1">
+              <a:shade val="15000"/>
+            </a:schemeClr>
+          </a:lnRef>
+          <a:fillRef idx="1">
+            <a:schemeClr val="accent1"/>
+          </a:fillRef>
+          <a:effectRef idx="0">
+            <a:schemeClr val="accent1"/>
+          </a:effectRef>
+          <a:fontRef idx="minor">
+            <a:schemeClr val="lt1"/>
+          </a:fontRef>
+        </p:style>
+        <p:txBody>
+          <a:bodyPr rtlCol="0" anchor="ctr"/>
+          <a:lstStyle/>
+          <a:p>
+            <a:pPr algn="ctr"/>
+            <a:r>
+              <a:rPr lang="ko-KR" altLang="en-US" sz="1200" dirty="0">
+                <a:solidFill>
+                  <a:schemeClr val="tx1"/>
+                </a:solidFill>
+                <a:latin typeface="페이퍼로지 4 Regular" pitchFamily="2" charset="-127"/>
+                <a:ea typeface="페이퍼로지 4 Regular" pitchFamily="2" charset="-127"/>
+              </a:rPr>
+              <a:t>종료</a:t>
+            </a:r>
+          </a:p>
+        </p:txBody>
+      </p:sp>
+      <p:sp>
+        <p:nvSpPr>
+          <p:cNvPr id="8" name="순서도: 대체 처리 7">
+            <a:extLst>
+              <a:ext uri="{FF2B5EF4-FFF2-40B4-BE49-F238E27FC236}">
+                <a16:creationId xmlns:a16="http://schemas.microsoft.com/office/drawing/2014/main" id="{9A7EA651-7A17-843F-DF12-E8D70273F077}"/>
+              </a:ext>
+            </a:extLst>
+          </p:cNvPr>
+          <p:cNvSpPr/>
+          <p:nvPr/>
+        </p:nvSpPr>
+        <p:spPr>
+          <a:xfrm>
+            <a:off x="800100" y="1986016"/>
+            <a:ext cx="1381126" cy="481066"/>
+          </a:xfrm>
+          <a:prstGeom prst="flowChartAlternateProcess">
+            <a:avLst/>
+          </a:prstGeom>
+          <a:noFill/>
+          <a:ln>
+            <a:solidFill>
+              <a:schemeClr val="tx1"/>
+            </a:solidFill>
+          </a:ln>
+        </p:spPr>
+        <p:style>
+          <a:lnRef idx="2">
+            <a:schemeClr val="accent1">
+              <a:shade val="15000"/>
+            </a:schemeClr>
+          </a:lnRef>
+          <a:fillRef idx="1">
+            <a:schemeClr val="accent1"/>
+          </a:fillRef>
+          <a:effectRef idx="0">
+            <a:schemeClr val="accent1"/>
+          </a:effectRef>
+          <a:fontRef idx="minor">
+            <a:schemeClr val="lt1"/>
+          </a:fontRef>
+        </p:style>
+        <p:txBody>
+          <a:bodyPr rtlCol="0" anchor="ctr"/>
+          <a:lstStyle/>
+          <a:p>
+            <a:pPr algn="ctr"/>
+            <a:r>
+              <a:rPr lang="ko-KR" altLang="en-US" sz="1200" dirty="0">
+                <a:solidFill>
+                  <a:schemeClr val="tx1"/>
+                </a:solidFill>
+                <a:latin typeface="페이퍼로지 4 Regular" pitchFamily="2" charset="-127"/>
+                <a:ea typeface="페이퍼로지 4 Regular" pitchFamily="2" charset="-127"/>
+              </a:rPr>
+              <a:t>게임 데이터 로딩</a:t>
+            </a:r>
+          </a:p>
+        </p:txBody>
+      </p:sp>
+      <p:sp>
+        <p:nvSpPr>
+          <p:cNvPr id="9" name="순서도: 대체 처리 8">
+            <a:extLst>
+              <a:ext uri="{FF2B5EF4-FFF2-40B4-BE49-F238E27FC236}">
+                <a16:creationId xmlns:a16="http://schemas.microsoft.com/office/drawing/2014/main" id="{C4DA3CC3-B7E4-D5A4-4207-448890A5E17B}"/>
+              </a:ext>
+            </a:extLst>
+          </p:cNvPr>
+          <p:cNvSpPr/>
+          <p:nvPr/>
+        </p:nvSpPr>
+        <p:spPr>
+          <a:xfrm>
+            <a:off x="800100" y="2738203"/>
+            <a:ext cx="1381126" cy="481066"/>
+          </a:xfrm>
+          <a:prstGeom prst="flowChartAlternateProcess">
+            <a:avLst/>
+          </a:prstGeom>
+          <a:noFill/>
+          <a:ln>
+            <a:solidFill>
+              <a:schemeClr val="tx1"/>
+            </a:solidFill>
+          </a:ln>
+        </p:spPr>
+        <p:style>
+          <a:lnRef idx="2">
+            <a:schemeClr val="accent1">
+              <a:shade val="15000"/>
+            </a:schemeClr>
+          </a:lnRef>
+          <a:fillRef idx="1">
+            <a:schemeClr val="accent1"/>
+          </a:fillRef>
+          <a:effectRef idx="0">
+            <a:schemeClr val="accent1"/>
+          </a:effectRef>
+          <a:fontRef idx="minor">
+            <a:schemeClr val="lt1"/>
+          </a:fontRef>
+        </p:style>
+        <p:txBody>
+          <a:bodyPr rtlCol="0" anchor="ctr"/>
+          <a:lstStyle/>
+          <a:p>
+            <a:pPr algn="ctr"/>
+            <a:r>
+              <a:rPr lang="ko-KR" altLang="en-US" sz="1200" dirty="0">
+                <a:solidFill>
+                  <a:schemeClr val="tx1"/>
+                </a:solidFill>
+                <a:latin typeface="페이퍼로지 4 Regular" pitchFamily="2" charset="-127"/>
+                <a:ea typeface="페이퍼로지 4 Regular" pitchFamily="2" charset="-127"/>
+              </a:rPr>
+              <a:t>세이브 데이터 로딩</a:t>
+            </a:r>
+          </a:p>
+        </p:txBody>
+      </p:sp>
+      <p:sp>
+        <p:nvSpPr>
+          <p:cNvPr id="10" name="순서도: 대체 처리 9">
+            <a:extLst>
+              <a:ext uri="{FF2B5EF4-FFF2-40B4-BE49-F238E27FC236}">
+                <a16:creationId xmlns:a16="http://schemas.microsoft.com/office/drawing/2014/main" id="{505920CA-0CD2-5A1B-4772-6046ADFA7D9F}"/>
+              </a:ext>
+            </a:extLst>
+          </p:cNvPr>
+          <p:cNvSpPr/>
+          <p:nvPr/>
+        </p:nvSpPr>
+        <p:spPr>
+          <a:xfrm>
+            <a:off x="800100" y="3490390"/>
+            <a:ext cx="1381126" cy="481066"/>
+          </a:xfrm>
+          <a:prstGeom prst="flowChartAlternateProcess">
+            <a:avLst/>
+          </a:prstGeom>
+          <a:noFill/>
+          <a:ln>
+            <a:solidFill>
+              <a:schemeClr val="tx1"/>
+            </a:solidFill>
+          </a:ln>
+        </p:spPr>
+        <p:style>
+          <a:lnRef idx="2">
+            <a:schemeClr val="accent1">
+              <a:shade val="15000"/>
+            </a:schemeClr>
+          </a:lnRef>
+          <a:fillRef idx="1">
+            <a:schemeClr val="accent1"/>
+          </a:fillRef>
+          <a:effectRef idx="0">
+            <a:schemeClr val="accent1"/>
+          </a:effectRef>
+          <a:fontRef idx="minor">
+            <a:schemeClr val="lt1"/>
+          </a:fontRef>
+        </p:style>
+        <p:txBody>
+          <a:bodyPr rtlCol="0" anchor="ctr"/>
+          <a:lstStyle/>
+          <a:p>
+            <a:pPr algn="ctr"/>
+            <a:r>
+              <a:rPr lang="ko-KR" altLang="en-US" sz="1200" dirty="0">
+                <a:solidFill>
+                  <a:schemeClr val="tx1"/>
+                </a:solidFill>
+                <a:latin typeface="페이퍼로지 4 Regular" pitchFamily="2" charset="-127"/>
+                <a:ea typeface="페이퍼로지 4 Regular" pitchFamily="2" charset="-127"/>
+              </a:rPr>
+              <a:t>배경 이미지 로딩</a:t>
+            </a:r>
+          </a:p>
+        </p:txBody>
+      </p:sp>
+      <p:sp>
+        <p:nvSpPr>
+          <p:cNvPr id="11" name="순서도: 대체 처리 10">
+            <a:extLst>
+              <a:ext uri="{FF2B5EF4-FFF2-40B4-BE49-F238E27FC236}">
+                <a16:creationId xmlns:a16="http://schemas.microsoft.com/office/drawing/2014/main" id="{D5F9390F-9108-443E-962B-23C6FAB2B241}"/>
+              </a:ext>
+            </a:extLst>
+          </p:cNvPr>
+          <p:cNvSpPr/>
+          <p:nvPr/>
+        </p:nvSpPr>
+        <p:spPr>
+          <a:xfrm>
+            <a:off x="800100" y="4242577"/>
+            <a:ext cx="1381126" cy="481066"/>
+          </a:xfrm>
+          <a:prstGeom prst="flowChartAlternateProcess">
+            <a:avLst/>
+          </a:prstGeom>
+          <a:noFill/>
+          <a:ln>
+            <a:solidFill>
+              <a:schemeClr val="tx1"/>
+            </a:solidFill>
+          </a:ln>
+        </p:spPr>
+        <p:style>
+          <a:lnRef idx="2">
+            <a:schemeClr val="accent1">
+              <a:shade val="15000"/>
+            </a:schemeClr>
+          </a:lnRef>
+          <a:fillRef idx="1">
+            <a:schemeClr val="accent1"/>
+          </a:fillRef>
+          <a:effectRef idx="0">
+            <a:schemeClr val="accent1"/>
+          </a:effectRef>
+          <a:fontRef idx="minor">
+            <a:schemeClr val="lt1"/>
+          </a:fontRef>
+        </p:style>
+        <p:txBody>
+          <a:bodyPr rtlCol="0" anchor="ctr"/>
+          <a:lstStyle/>
+          <a:p>
+            <a:pPr algn="ctr"/>
+            <a:r>
+              <a:rPr lang="ko-KR" altLang="en-US" sz="1200" dirty="0">
+                <a:solidFill>
+                  <a:schemeClr val="tx1"/>
+                </a:solidFill>
+                <a:latin typeface="페이퍼로지 4 Regular" pitchFamily="2" charset="-127"/>
+                <a:ea typeface="페이퍼로지 4 Regular" pitchFamily="2" charset="-127"/>
+              </a:rPr>
+              <a:t>게임 타이틀 로딩</a:t>
+            </a:r>
+          </a:p>
+        </p:txBody>
+      </p:sp>
     </p:spTree>
     <p:extLst>
       <p:ext uri="{BB962C8B-B14F-4D97-AF65-F5344CB8AC3E}">
         <p14:creationId xmlns:p14="http://schemas.microsoft.com/office/powerpoint/2010/main" val="1811921791"/>
+      </p:ext>
+    </p:extLst>
+  </p:cSld>
+  <p:clrMapOvr>
+    <a:masterClrMapping/>
+  </p:clrMapOvr>
+</p:sld>
+</file>
+
+<file path=ppt/slides/slide5.xml><?xml version="1.0" encoding="utf-8"?>
+<p:sld xmlns:a="http://schemas.openxmlformats.org/drawingml/2006/main" xmlns:r="http://schemas.openxmlformats.org/officeDocument/2006/relationships" xmlns:p="http://schemas.openxmlformats.org/presentationml/2006/main">
+  <p:cSld>
+    <p:spTree>
+      <p:nvGrpSpPr>
+        <p:cNvPr id="1" name="">
+          <a:extLst>
+            <a:ext uri="{FF2B5EF4-FFF2-40B4-BE49-F238E27FC236}">
+              <a16:creationId xmlns:a16="http://schemas.microsoft.com/office/drawing/2014/main" id="{EF69E072-1222-50ED-127D-D01D04B80B46}"/>
+            </a:ext>
+          </a:extLst>
+        </p:cNvPr>
+        <p:cNvGrpSpPr/>
+        <p:nvPr/>
+      </p:nvGrpSpPr>
+      <p:grpSpPr>
+        <a:xfrm>
+          <a:off x="0" y="0"/>
+          <a:ext cx="0" cy="0"/>
+          <a:chOff x="0" y="0"/>
+          <a:chExt cx="0" cy="0"/>
+        </a:xfrm>
+      </p:grpSpPr>
+      <p:sp>
+        <p:nvSpPr>
+          <p:cNvPr id="3" name="사각형: 잘린 대각선 방향 모서리 2">
+            <a:extLst>
+              <a:ext uri="{FF2B5EF4-FFF2-40B4-BE49-F238E27FC236}">
+                <a16:creationId xmlns:a16="http://schemas.microsoft.com/office/drawing/2014/main" id="{08F111E7-C894-2C2F-1004-238AB8A33ABD}"/>
+              </a:ext>
+            </a:extLst>
+          </p:cNvPr>
+          <p:cNvSpPr/>
+          <p:nvPr/>
+        </p:nvSpPr>
+        <p:spPr>
+          <a:xfrm>
+            <a:off x="212436" y="230909"/>
+            <a:ext cx="11767127" cy="6437746"/>
+          </a:xfrm>
+          <a:prstGeom prst="snip2DiagRect">
+            <a:avLst>
+              <a:gd name="adj1" fmla="val 0"/>
+              <a:gd name="adj2" fmla="val 6911"/>
+            </a:avLst>
+          </a:prstGeom>
+          <a:noFill/>
+          <a:ln w="53975">
+            <a:solidFill>
+              <a:schemeClr val="tx1"/>
+            </a:solidFill>
+          </a:ln>
+        </p:spPr>
+        <p:style>
+          <a:lnRef idx="2">
+            <a:schemeClr val="accent1">
+              <a:shade val="15000"/>
+            </a:schemeClr>
+          </a:lnRef>
+          <a:fillRef idx="1">
+            <a:schemeClr val="accent1"/>
+          </a:fillRef>
+          <a:effectRef idx="0">
+            <a:schemeClr val="accent1"/>
+          </a:effectRef>
+          <a:fontRef idx="minor">
+            <a:schemeClr val="lt1"/>
+          </a:fontRef>
+        </p:style>
+        <p:txBody>
+          <a:bodyPr rtlCol="0" anchor="ctr"/>
+          <a:lstStyle/>
+          <a:p>
+            <a:pPr algn="ctr"/>
+            <a:endParaRPr lang="ko-KR" altLang="en-US"/>
+          </a:p>
+        </p:txBody>
+      </p:sp>
+      <p:sp>
+        <p:nvSpPr>
+          <p:cNvPr id="4" name="직사각형 3">
+            <a:extLst>
+              <a:ext uri="{FF2B5EF4-FFF2-40B4-BE49-F238E27FC236}">
+                <a16:creationId xmlns:a16="http://schemas.microsoft.com/office/drawing/2014/main" id="{1C7A4A60-95BF-8056-D2C5-337DC49D393A}"/>
+              </a:ext>
+            </a:extLst>
+          </p:cNvPr>
+          <p:cNvSpPr/>
+          <p:nvPr/>
+        </p:nvSpPr>
+        <p:spPr>
+          <a:xfrm>
+            <a:off x="800100" y="491836"/>
+            <a:ext cx="10672401" cy="432089"/>
+          </a:xfrm>
+          <a:prstGeom prst="rect">
+            <a:avLst/>
+          </a:prstGeom>
+          <a:noFill/>
+          <a:ln>
+            <a:noFill/>
+          </a:ln>
+        </p:spPr>
+        <p:style>
+          <a:lnRef idx="2">
+            <a:schemeClr val="accent1">
+              <a:shade val="15000"/>
+            </a:schemeClr>
+          </a:lnRef>
+          <a:fillRef idx="1">
+            <a:schemeClr val="accent1"/>
+          </a:fillRef>
+          <a:effectRef idx="0">
+            <a:schemeClr val="accent1"/>
+          </a:effectRef>
+          <a:fontRef idx="minor">
+            <a:schemeClr val="lt1"/>
+          </a:fontRef>
+        </p:style>
+        <p:txBody>
+          <a:bodyPr rtlCol="0" anchor="ctr"/>
+          <a:lstStyle/>
+          <a:p>
+            <a:pPr algn="l"/>
+            <a:r>
+              <a:rPr lang="ko-KR" altLang="en-US" dirty="0">
+                <a:solidFill>
+                  <a:schemeClr val="tx1"/>
+                </a:solidFill>
+                <a:latin typeface="페이퍼로지 6 SemiBold" pitchFamily="2" charset="-127"/>
+                <a:ea typeface="페이퍼로지 6 SemiBold" pitchFamily="2" charset="-127"/>
+                <a:cs typeface="Pretendard Medium" panose="02000603000000020004" pitchFamily="2" charset="-127"/>
+              </a:rPr>
+              <a:t>스타트 씬 흐름도</a:t>
+            </a:r>
+          </a:p>
+        </p:txBody>
+      </p:sp>
+      <p:sp>
+        <p:nvSpPr>
+          <p:cNvPr id="5" name="다이아몬드 4">
+            <a:extLst>
+              <a:ext uri="{FF2B5EF4-FFF2-40B4-BE49-F238E27FC236}">
+                <a16:creationId xmlns:a16="http://schemas.microsoft.com/office/drawing/2014/main" id="{BC8DAB82-1996-7223-2B77-8D2D21514C7C}"/>
+              </a:ext>
+            </a:extLst>
+          </p:cNvPr>
+          <p:cNvSpPr/>
+          <p:nvPr/>
+        </p:nvSpPr>
+        <p:spPr>
+          <a:xfrm>
+            <a:off x="430718" y="563491"/>
+            <a:ext cx="288780" cy="288780"/>
+          </a:xfrm>
+          <a:prstGeom prst="diamond">
+            <a:avLst/>
+          </a:prstGeom>
+          <a:noFill/>
+          <a:ln w="19050">
+            <a:solidFill>
+              <a:schemeClr val="tx1"/>
+            </a:solidFill>
+          </a:ln>
+        </p:spPr>
+        <p:style>
+          <a:lnRef idx="2">
+            <a:schemeClr val="accent1">
+              <a:shade val="15000"/>
+            </a:schemeClr>
+          </a:lnRef>
+          <a:fillRef idx="1">
+            <a:schemeClr val="accent1"/>
+          </a:fillRef>
+          <a:effectRef idx="0">
+            <a:schemeClr val="accent1"/>
+          </a:effectRef>
+          <a:fontRef idx="minor">
+            <a:schemeClr val="lt1"/>
+          </a:fontRef>
+        </p:style>
+        <p:txBody>
+          <a:bodyPr rtlCol="0" anchor="ctr"/>
+          <a:lstStyle/>
+          <a:p>
+            <a:pPr algn="l"/>
+            <a:endParaRPr lang="ko-KR" altLang="en-US" sz="1600" dirty="0">
+              <a:solidFill>
+                <a:schemeClr val="tx1"/>
+              </a:solidFill>
+              <a:latin typeface="페이퍼로지 5 Medium" pitchFamily="2" charset="-127"/>
+              <a:ea typeface="페이퍼로지 5 Medium" pitchFamily="2" charset="-127"/>
+              <a:cs typeface="Pretendard Medium" panose="02000603000000020004" pitchFamily="2" charset="-127"/>
+            </a:endParaRPr>
+          </a:p>
+        </p:txBody>
+      </p:sp>
+      <p:sp>
+        <p:nvSpPr>
+          <p:cNvPr id="6" name="순서도: 수행의 시작/종료 5">
+            <a:extLst>
+              <a:ext uri="{FF2B5EF4-FFF2-40B4-BE49-F238E27FC236}">
+                <a16:creationId xmlns:a16="http://schemas.microsoft.com/office/drawing/2014/main" id="{71B4FC4A-EBDE-E610-0DD8-D61836DEF38C}"/>
+              </a:ext>
+            </a:extLst>
+          </p:cNvPr>
+          <p:cNvSpPr/>
+          <p:nvPr/>
+        </p:nvSpPr>
+        <p:spPr>
+          <a:xfrm>
+            <a:off x="800100" y="1233829"/>
+            <a:ext cx="1381126" cy="481066"/>
+          </a:xfrm>
+          <a:prstGeom prst="flowChartTerminator">
+            <a:avLst/>
+          </a:prstGeom>
+          <a:solidFill>
+            <a:schemeClr val="accent2"/>
+          </a:solidFill>
+          <a:ln>
+            <a:solidFill>
+              <a:schemeClr val="tx1"/>
+            </a:solidFill>
+          </a:ln>
+        </p:spPr>
+        <p:style>
+          <a:lnRef idx="2">
+            <a:schemeClr val="accent1">
+              <a:shade val="15000"/>
+            </a:schemeClr>
+          </a:lnRef>
+          <a:fillRef idx="1">
+            <a:schemeClr val="accent1"/>
+          </a:fillRef>
+          <a:effectRef idx="0">
+            <a:schemeClr val="accent1"/>
+          </a:effectRef>
+          <a:fontRef idx="minor">
+            <a:schemeClr val="lt1"/>
+          </a:fontRef>
+        </p:style>
+        <p:txBody>
+          <a:bodyPr rtlCol="0" anchor="ctr"/>
+          <a:lstStyle/>
+          <a:p>
+            <a:pPr algn="ctr"/>
+            <a:r>
+              <a:rPr lang="ko-KR" altLang="en-US" sz="1200" dirty="0">
+                <a:solidFill>
+                  <a:schemeClr val="tx1"/>
+                </a:solidFill>
+                <a:latin typeface="페이퍼로지 4 Regular" pitchFamily="2" charset="-127"/>
+                <a:ea typeface="페이퍼로지 4 Regular" pitchFamily="2" charset="-127"/>
+              </a:rPr>
+              <a:t>시작</a:t>
+            </a:r>
+          </a:p>
+        </p:txBody>
+      </p:sp>
+      <p:sp>
+        <p:nvSpPr>
+          <p:cNvPr id="7" name="순서도: 수행의 시작/종료 6">
+            <a:extLst>
+              <a:ext uri="{FF2B5EF4-FFF2-40B4-BE49-F238E27FC236}">
+                <a16:creationId xmlns:a16="http://schemas.microsoft.com/office/drawing/2014/main" id="{6494BE24-AA83-2E1B-CF65-EC5EFD4375E1}"/>
+              </a:ext>
+            </a:extLst>
+          </p:cNvPr>
+          <p:cNvSpPr/>
+          <p:nvPr/>
+        </p:nvSpPr>
+        <p:spPr>
+          <a:xfrm>
+            <a:off x="800100" y="5383638"/>
+            <a:ext cx="1381126" cy="481066"/>
+          </a:xfrm>
+          <a:prstGeom prst="flowChartTerminator">
+            <a:avLst/>
+          </a:prstGeom>
+          <a:solidFill>
+            <a:schemeClr val="accent2"/>
+          </a:solidFill>
+          <a:ln>
+            <a:solidFill>
+              <a:schemeClr val="tx1"/>
+            </a:solidFill>
+          </a:ln>
+        </p:spPr>
+        <p:style>
+          <a:lnRef idx="2">
+            <a:schemeClr val="accent1">
+              <a:shade val="15000"/>
+            </a:schemeClr>
+          </a:lnRef>
+          <a:fillRef idx="1">
+            <a:schemeClr val="accent1"/>
+          </a:fillRef>
+          <a:effectRef idx="0">
+            <a:schemeClr val="accent1"/>
+          </a:effectRef>
+          <a:fontRef idx="minor">
+            <a:schemeClr val="lt1"/>
+          </a:fontRef>
+        </p:style>
+        <p:txBody>
+          <a:bodyPr rtlCol="0" anchor="ctr"/>
+          <a:lstStyle/>
+          <a:p>
+            <a:pPr algn="ctr"/>
+            <a:r>
+              <a:rPr lang="ko-KR" altLang="en-US" sz="1200" dirty="0">
+                <a:solidFill>
+                  <a:schemeClr val="tx1"/>
+                </a:solidFill>
+                <a:latin typeface="페이퍼로지 4 Regular" pitchFamily="2" charset="-127"/>
+                <a:ea typeface="페이퍼로지 4 Regular" pitchFamily="2" charset="-127"/>
+              </a:rPr>
+              <a:t>종료</a:t>
+            </a:r>
+          </a:p>
+        </p:txBody>
+      </p:sp>
+      <p:sp>
+        <p:nvSpPr>
+          <p:cNvPr id="8" name="순서도: 대체 처리 7">
+            <a:extLst>
+              <a:ext uri="{FF2B5EF4-FFF2-40B4-BE49-F238E27FC236}">
+                <a16:creationId xmlns:a16="http://schemas.microsoft.com/office/drawing/2014/main" id="{B5CCBC8E-134A-086F-C7DF-20AC79A87CD3}"/>
+              </a:ext>
+            </a:extLst>
+          </p:cNvPr>
+          <p:cNvSpPr/>
+          <p:nvPr/>
+        </p:nvSpPr>
+        <p:spPr>
+          <a:xfrm>
+            <a:off x="800100" y="1986016"/>
+            <a:ext cx="1381126" cy="481066"/>
+          </a:xfrm>
+          <a:prstGeom prst="flowChartAlternateProcess">
+            <a:avLst/>
+          </a:prstGeom>
+          <a:noFill/>
+          <a:ln>
+            <a:solidFill>
+              <a:schemeClr val="tx1"/>
+            </a:solidFill>
+          </a:ln>
+        </p:spPr>
+        <p:style>
+          <a:lnRef idx="2">
+            <a:schemeClr val="accent1">
+              <a:shade val="15000"/>
+            </a:schemeClr>
+          </a:lnRef>
+          <a:fillRef idx="1">
+            <a:schemeClr val="accent1"/>
+          </a:fillRef>
+          <a:effectRef idx="0">
+            <a:schemeClr val="accent1"/>
+          </a:effectRef>
+          <a:fontRef idx="minor">
+            <a:schemeClr val="lt1"/>
+          </a:fontRef>
+        </p:style>
+        <p:txBody>
+          <a:bodyPr rtlCol="0" anchor="ctr"/>
+          <a:lstStyle/>
+          <a:p>
+            <a:pPr algn="ctr"/>
+            <a:endParaRPr lang="ko-KR" altLang="en-US" sz="1200" dirty="0">
+              <a:solidFill>
+                <a:schemeClr val="tx1"/>
+              </a:solidFill>
+              <a:latin typeface="페이퍼로지 4 Regular" pitchFamily="2" charset="-127"/>
+              <a:ea typeface="페이퍼로지 4 Regular" pitchFamily="2" charset="-127"/>
+            </a:endParaRPr>
+          </a:p>
+        </p:txBody>
+      </p:sp>
+    </p:spTree>
+    <p:extLst>
+      <p:ext uri="{BB962C8B-B14F-4D97-AF65-F5344CB8AC3E}">
+        <p14:creationId xmlns:p14="http://schemas.microsoft.com/office/powerpoint/2010/main" val="177156719"/>
+      </p:ext>
+    </p:extLst>
+  </p:cSld>
+  <p:clrMapOvr>
+    <a:masterClrMapping/>
+  </p:clrMapOvr>
+</p:sld>
+</file>
+
+<file path=ppt/slides/slide6.xml><?xml version="1.0" encoding="utf-8"?>
+<p:sld xmlns:a="http://schemas.openxmlformats.org/drawingml/2006/main" xmlns:r="http://schemas.openxmlformats.org/officeDocument/2006/relationships" xmlns:p="http://schemas.openxmlformats.org/presentationml/2006/main">
+  <p:cSld>
+    <p:spTree>
+      <p:nvGrpSpPr>
+        <p:cNvPr id="1" name="">
+          <a:extLst>
+            <a:ext uri="{FF2B5EF4-FFF2-40B4-BE49-F238E27FC236}">
+              <a16:creationId xmlns:a16="http://schemas.microsoft.com/office/drawing/2014/main" id="{FA9CA4DF-EE6E-2CF3-A470-16C9A3EA7987}"/>
+            </a:ext>
+          </a:extLst>
+        </p:cNvPr>
+        <p:cNvGrpSpPr/>
+        <p:nvPr/>
+      </p:nvGrpSpPr>
+      <p:grpSpPr>
+        <a:xfrm>
+          <a:off x="0" y="0"/>
+          <a:ext cx="0" cy="0"/>
+          <a:chOff x="0" y="0"/>
+          <a:chExt cx="0" cy="0"/>
+        </a:xfrm>
+      </p:grpSpPr>
+      <p:sp>
+        <p:nvSpPr>
+          <p:cNvPr id="3" name="사각형: 잘린 대각선 방향 모서리 2">
+            <a:extLst>
+              <a:ext uri="{FF2B5EF4-FFF2-40B4-BE49-F238E27FC236}">
+                <a16:creationId xmlns:a16="http://schemas.microsoft.com/office/drawing/2014/main" id="{B0223C09-7530-D1A5-635E-1893BDE78545}"/>
+              </a:ext>
+            </a:extLst>
+          </p:cNvPr>
+          <p:cNvSpPr/>
+          <p:nvPr/>
+        </p:nvSpPr>
+        <p:spPr>
+          <a:xfrm>
+            <a:off x="212436" y="230909"/>
+            <a:ext cx="11767127" cy="6437746"/>
+          </a:xfrm>
+          <a:prstGeom prst="snip2DiagRect">
+            <a:avLst>
+              <a:gd name="adj1" fmla="val 0"/>
+              <a:gd name="adj2" fmla="val 6911"/>
+            </a:avLst>
+          </a:prstGeom>
+          <a:noFill/>
+          <a:ln w="53975">
+            <a:solidFill>
+              <a:schemeClr val="tx1"/>
+            </a:solidFill>
+          </a:ln>
+        </p:spPr>
+        <p:style>
+          <a:lnRef idx="2">
+            <a:schemeClr val="accent1">
+              <a:shade val="15000"/>
+            </a:schemeClr>
+          </a:lnRef>
+          <a:fillRef idx="1">
+            <a:schemeClr val="accent1"/>
+          </a:fillRef>
+          <a:effectRef idx="0">
+            <a:schemeClr val="accent1"/>
+          </a:effectRef>
+          <a:fontRef idx="minor">
+            <a:schemeClr val="lt1"/>
+          </a:fontRef>
+        </p:style>
+        <p:txBody>
+          <a:bodyPr rtlCol="0" anchor="ctr"/>
+          <a:lstStyle/>
+          <a:p>
+            <a:pPr algn="ctr"/>
+            <a:endParaRPr lang="ko-KR" altLang="en-US"/>
+          </a:p>
+        </p:txBody>
+      </p:sp>
+      <p:sp>
+        <p:nvSpPr>
+          <p:cNvPr id="4" name="직사각형 3">
+            <a:extLst>
+              <a:ext uri="{FF2B5EF4-FFF2-40B4-BE49-F238E27FC236}">
+                <a16:creationId xmlns:a16="http://schemas.microsoft.com/office/drawing/2014/main" id="{009D52E1-ED2F-5BB2-3C73-145DECEE3437}"/>
+              </a:ext>
+            </a:extLst>
+          </p:cNvPr>
+          <p:cNvSpPr/>
+          <p:nvPr/>
+        </p:nvSpPr>
+        <p:spPr>
+          <a:xfrm>
+            <a:off x="800100" y="491836"/>
+            <a:ext cx="10672401" cy="432089"/>
+          </a:xfrm>
+          <a:prstGeom prst="rect">
+            <a:avLst/>
+          </a:prstGeom>
+          <a:noFill/>
+          <a:ln>
+            <a:noFill/>
+          </a:ln>
+        </p:spPr>
+        <p:style>
+          <a:lnRef idx="2">
+            <a:schemeClr val="accent1">
+              <a:shade val="15000"/>
+            </a:schemeClr>
+          </a:lnRef>
+          <a:fillRef idx="1">
+            <a:schemeClr val="accent1"/>
+          </a:fillRef>
+          <a:effectRef idx="0">
+            <a:schemeClr val="accent1"/>
+          </a:effectRef>
+          <a:fontRef idx="minor">
+            <a:schemeClr val="lt1"/>
+          </a:fontRef>
+        </p:style>
+        <p:txBody>
+          <a:bodyPr rtlCol="0" anchor="ctr"/>
+          <a:lstStyle/>
+          <a:p>
+            <a:pPr algn="l"/>
+            <a:r>
+              <a:rPr lang="ko-KR" altLang="en-US" dirty="0">
+                <a:solidFill>
+                  <a:schemeClr val="tx1"/>
+                </a:solidFill>
+                <a:latin typeface="페이퍼로지 6 SemiBold" pitchFamily="2" charset="-127"/>
+                <a:ea typeface="페이퍼로지 6 SemiBold" pitchFamily="2" charset="-127"/>
+                <a:cs typeface="Pretendard Medium" panose="02000603000000020004" pitchFamily="2" charset="-127"/>
+              </a:rPr>
+              <a:t>스타트 씬 흐름도</a:t>
+            </a:r>
+          </a:p>
+        </p:txBody>
+      </p:sp>
+      <p:sp>
+        <p:nvSpPr>
+          <p:cNvPr id="5" name="다이아몬드 4">
+            <a:extLst>
+              <a:ext uri="{FF2B5EF4-FFF2-40B4-BE49-F238E27FC236}">
+                <a16:creationId xmlns:a16="http://schemas.microsoft.com/office/drawing/2014/main" id="{64C641DF-3F90-4C2D-F369-828441E79AE1}"/>
+              </a:ext>
+            </a:extLst>
+          </p:cNvPr>
+          <p:cNvSpPr/>
+          <p:nvPr/>
+        </p:nvSpPr>
+        <p:spPr>
+          <a:xfrm>
+            <a:off x="430718" y="563491"/>
+            <a:ext cx="288780" cy="288780"/>
+          </a:xfrm>
+          <a:prstGeom prst="diamond">
+            <a:avLst/>
+          </a:prstGeom>
+          <a:noFill/>
+          <a:ln w="19050">
+            <a:solidFill>
+              <a:schemeClr val="tx1"/>
+            </a:solidFill>
+          </a:ln>
+        </p:spPr>
+        <p:style>
+          <a:lnRef idx="2">
+            <a:schemeClr val="accent1">
+              <a:shade val="15000"/>
+            </a:schemeClr>
+          </a:lnRef>
+          <a:fillRef idx="1">
+            <a:schemeClr val="accent1"/>
+          </a:fillRef>
+          <a:effectRef idx="0">
+            <a:schemeClr val="accent1"/>
+          </a:effectRef>
+          <a:fontRef idx="minor">
+            <a:schemeClr val="lt1"/>
+          </a:fontRef>
+        </p:style>
+        <p:txBody>
+          <a:bodyPr rtlCol="0" anchor="ctr"/>
+          <a:lstStyle/>
+          <a:p>
+            <a:pPr algn="l"/>
+            <a:endParaRPr lang="ko-KR" altLang="en-US" sz="1600" dirty="0">
+              <a:solidFill>
+                <a:schemeClr val="tx1"/>
+              </a:solidFill>
+              <a:latin typeface="페이퍼로지 5 Medium" pitchFamily="2" charset="-127"/>
+              <a:ea typeface="페이퍼로지 5 Medium" pitchFamily="2" charset="-127"/>
+              <a:cs typeface="Pretendard Medium" panose="02000603000000020004" pitchFamily="2" charset="-127"/>
+            </a:endParaRPr>
+          </a:p>
+        </p:txBody>
+      </p:sp>
+      <p:sp>
+        <p:nvSpPr>
+          <p:cNvPr id="6" name="순서도: 수행의 시작/종료 5">
+            <a:extLst>
+              <a:ext uri="{FF2B5EF4-FFF2-40B4-BE49-F238E27FC236}">
+                <a16:creationId xmlns:a16="http://schemas.microsoft.com/office/drawing/2014/main" id="{5A27BD83-85EC-C739-1802-6F7DAAB30090}"/>
+              </a:ext>
+            </a:extLst>
+          </p:cNvPr>
+          <p:cNvSpPr/>
+          <p:nvPr/>
+        </p:nvSpPr>
+        <p:spPr>
+          <a:xfrm>
+            <a:off x="800100" y="1233829"/>
+            <a:ext cx="1381126" cy="481066"/>
+          </a:xfrm>
+          <a:prstGeom prst="flowChartTerminator">
+            <a:avLst/>
+          </a:prstGeom>
+          <a:solidFill>
+            <a:schemeClr val="accent2"/>
+          </a:solidFill>
+          <a:ln>
+            <a:solidFill>
+              <a:schemeClr val="tx1"/>
+            </a:solidFill>
+          </a:ln>
+        </p:spPr>
+        <p:style>
+          <a:lnRef idx="2">
+            <a:schemeClr val="accent1">
+              <a:shade val="15000"/>
+            </a:schemeClr>
+          </a:lnRef>
+          <a:fillRef idx="1">
+            <a:schemeClr val="accent1"/>
+          </a:fillRef>
+          <a:effectRef idx="0">
+            <a:schemeClr val="accent1"/>
+          </a:effectRef>
+          <a:fontRef idx="minor">
+            <a:schemeClr val="lt1"/>
+          </a:fontRef>
+        </p:style>
+        <p:txBody>
+          <a:bodyPr rtlCol="0" anchor="ctr"/>
+          <a:lstStyle/>
+          <a:p>
+            <a:pPr algn="ctr"/>
+            <a:r>
+              <a:rPr lang="ko-KR" altLang="en-US" sz="1200" dirty="0">
+                <a:solidFill>
+                  <a:schemeClr val="tx1"/>
+                </a:solidFill>
+                <a:latin typeface="페이퍼로지 4 Regular" pitchFamily="2" charset="-127"/>
+                <a:ea typeface="페이퍼로지 4 Regular" pitchFamily="2" charset="-127"/>
+              </a:rPr>
+              <a:t>시작</a:t>
+            </a:r>
+          </a:p>
+        </p:txBody>
+      </p:sp>
+      <p:sp>
+        <p:nvSpPr>
+          <p:cNvPr id="7" name="순서도: 수행의 시작/종료 6">
+            <a:extLst>
+              <a:ext uri="{FF2B5EF4-FFF2-40B4-BE49-F238E27FC236}">
+                <a16:creationId xmlns:a16="http://schemas.microsoft.com/office/drawing/2014/main" id="{887D820B-FD65-0F22-E9FD-83F80473EBA4}"/>
+              </a:ext>
+            </a:extLst>
+          </p:cNvPr>
+          <p:cNvSpPr/>
+          <p:nvPr/>
+        </p:nvSpPr>
+        <p:spPr>
+          <a:xfrm>
+            <a:off x="800100" y="5383638"/>
+            <a:ext cx="1381126" cy="481066"/>
+          </a:xfrm>
+          <a:prstGeom prst="flowChartTerminator">
+            <a:avLst/>
+          </a:prstGeom>
+          <a:solidFill>
+            <a:schemeClr val="accent2"/>
+          </a:solidFill>
+          <a:ln>
+            <a:solidFill>
+              <a:schemeClr val="tx1"/>
+            </a:solidFill>
+          </a:ln>
+        </p:spPr>
+        <p:style>
+          <a:lnRef idx="2">
+            <a:schemeClr val="accent1">
+              <a:shade val="15000"/>
+            </a:schemeClr>
+          </a:lnRef>
+          <a:fillRef idx="1">
+            <a:schemeClr val="accent1"/>
+          </a:fillRef>
+          <a:effectRef idx="0">
+            <a:schemeClr val="accent1"/>
+          </a:effectRef>
+          <a:fontRef idx="minor">
+            <a:schemeClr val="lt1"/>
+          </a:fontRef>
+        </p:style>
+        <p:txBody>
+          <a:bodyPr rtlCol="0" anchor="ctr"/>
+          <a:lstStyle/>
+          <a:p>
+            <a:pPr algn="ctr"/>
+            <a:r>
+              <a:rPr lang="ko-KR" altLang="en-US" sz="1200" dirty="0">
+                <a:solidFill>
+                  <a:schemeClr val="tx1"/>
+                </a:solidFill>
+                <a:latin typeface="페이퍼로지 4 Regular" pitchFamily="2" charset="-127"/>
+                <a:ea typeface="페이퍼로지 4 Regular" pitchFamily="2" charset="-127"/>
+              </a:rPr>
+              <a:t>종료</a:t>
+            </a:r>
+          </a:p>
+        </p:txBody>
+      </p:sp>
+      <p:sp>
+        <p:nvSpPr>
+          <p:cNvPr id="8" name="순서도: 대체 처리 7">
+            <a:extLst>
+              <a:ext uri="{FF2B5EF4-FFF2-40B4-BE49-F238E27FC236}">
+                <a16:creationId xmlns:a16="http://schemas.microsoft.com/office/drawing/2014/main" id="{9A819EF1-8522-022F-38CA-6F3E24B0C99F}"/>
+              </a:ext>
+            </a:extLst>
+          </p:cNvPr>
+          <p:cNvSpPr/>
+          <p:nvPr/>
+        </p:nvSpPr>
+        <p:spPr>
+          <a:xfrm>
+            <a:off x="800100" y="1986016"/>
+            <a:ext cx="1381126" cy="481066"/>
+          </a:xfrm>
+          <a:prstGeom prst="flowChartAlternateProcess">
+            <a:avLst/>
+          </a:prstGeom>
+          <a:noFill/>
+          <a:ln>
+            <a:solidFill>
+              <a:schemeClr val="tx1"/>
+            </a:solidFill>
+          </a:ln>
+        </p:spPr>
+        <p:style>
+          <a:lnRef idx="2">
+            <a:schemeClr val="accent1">
+              <a:shade val="15000"/>
+            </a:schemeClr>
+          </a:lnRef>
+          <a:fillRef idx="1">
+            <a:schemeClr val="accent1"/>
+          </a:fillRef>
+          <a:effectRef idx="0">
+            <a:schemeClr val="accent1"/>
+          </a:effectRef>
+          <a:fontRef idx="minor">
+            <a:schemeClr val="lt1"/>
+          </a:fontRef>
+        </p:style>
+        <p:txBody>
+          <a:bodyPr rtlCol="0" anchor="ctr"/>
+          <a:lstStyle/>
+          <a:p>
+            <a:pPr algn="ctr"/>
+            <a:endParaRPr lang="ko-KR" altLang="en-US" sz="1200" dirty="0">
+              <a:solidFill>
+                <a:schemeClr val="tx1"/>
+              </a:solidFill>
+              <a:latin typeface="페이퍼로지 4 Regular" pitchFamily="2" charset="-127"/>
+              <a:ea typeface="페이퍼로지 4 Regular" pitchFamily="2" charset="-127"/>
+            </a:endParaRPr>
+          </a:p>
+        </p:txBody>
+      </p:sp>
+    </p:spTree>
+    <p:extLst>
+      <p:ext uri="{BB962C8B-B14F-4D97-AF65-F5344CB8AC3E}">
+        <p14:creationId xmlns:p14="http://schemas.microsoft.com/office/powerpoint/2010/main" val="1407821380"/>
+      </p:ext>
+    </p:extLst>
+  </p:cSld>
+  <p:clrMapOvr>
+    <a:masterClrMapping/>
+  </p:clrMapOvr>
+</p:sld>
+</file>
+
+<file path=ppt/slides/slide7.xml><?xml version="1.0" encoding="utf-8"?>
+<p:sld xmlns:a="http://schemas.openxmlformats.org/drawingml/2006/main" xmlns:r="http://schemas.openxmlformats.org/officeDocument/2006/relationships" xmlns:p="http://schemas.openxmlformats.org/presentationml/2006/main">
+  <p:cSld>
+    <p:spTree>
+      <p:nvGrpSpPr>
+        <p:cNvPr id="1" name="">
+          <a:extLst>
+            <a:ext uri="{FF2B5EF4-FFF2-40B4-BE49-F238E27FC236}">
+              <a16:creationId xmlns:a16="http://schemas.microsoft.com/office/drawing/2014/main" id="{147D4110-5FF8-BDC4-F48B-3104C718D7F3}"/>
+            </a:ext>
+          </a:extLst>
+        </p:cNvPr>
+        <p:cNvGrpSpPr/>
+        <p:nvPr/>
+      </p:nvGrpSpPr>
+      <p:grpSpPr>
+        <a:xfrm>
+          <a:off x="0" y="0"/>
+          <a:ext cx="0" cy="0"/>
+          <a:chOff x="0" y="0"/>
+          <a:chExt cx="0" cy="0"/>
+        </a:xfrm>
+      </p:grpSpPr>
+      <p:sp>
+        <p:nvSpPr>
+          <p:cNvPr id="3" name="사각형: 잘린 대각선 방향 모서리 2">
+            <a:extLst>
+              <a:ext uri="{FF2B5EF4-FFF2-40B4-BE49-F238E27FC236}">
+                <a16:creationId xmlns:a16="http://schemas.microsoft.com/office/drawing/2014/main" id="{F5ADBFCB-AD4A-B082-6D6C-FD1BDB4274E1}"/>
+              </a:ext>
+            </a:extLst>
+          </p:cNvPr>
+          <p:cNvSpPr/>
+          <p:nvPr/>
+        </p:nvSpPr>
+        <p:spPr>
+          <a:xfrm>
+            <a:off x="212436" y="230909"/>
+            <a:ext cx="11767127" cy="6437746"/>
+          </a:xfrm>
+          <a:prstGeom prst="snip2DiagRect">
+            <a:avLst>
+              <a:gd name="adj1" fmla="val 0"/>
+              <a:gd name="adj2" fmla="val 6911"/>
+            </a:avLst>
+          </a:prstGeom>
+          <a:noFill/>
+          <a:ln w="53975">
+            <a:solidFill>
+              <a:schemeClr val="tx1"/>
+            </a:solidFill>
+          </a:ln>
+        </p:spPr>
+        <p:style>
+          <a:lnRef idx="2">
+            <a:schemeClr val="accent1">
+              <a:shade val="15000"/>
+            </a:schemeClr>
+          </a:lnRef>
+          <a:fillRef idx="1">
+            <a:schemeClr val="accent1"/>
+          </a:fillRef>
+          <a:effectRef idx="0">
+            <a:schemeClr val="accent1"/>
+          </a:effectRef>
+          <a:fontRef idx="minor">
+            <a:schemeClr val="lt1"/>
+          </a:fontRef>
+        </p:style>
+        <p:txBody>
+          <a:bodyPr rtlCol="0" anchor="ctr"/>
+          <a:lstStyle/>
+          <a:p>
+            <a:pPr algn="ctr"/>
+            <a:endParaRPr lang="ko-KR" altLang="en-US"/>
+          </a:p>
+        </p:txBody>
+      </p:sp>
+      <p:sp>
+        <p:nvSpPr>
+          <p:cNvPr id="4" name="직사각형 3">
+            <a:extLst>
+              <a:ext uri="{FF2B5EF4-FFF2-40B4-BE49-F238E27FC236}">
+                <a16:creationId xmlns:a16="http://schemas.microsoft.com/office/drawing/2014/main" id="{D4C40037-13C1-BF3A-09C7-736300753FB7}"/>
+              </a:ext>
+            </a:extLst>
+          </p:cNvPr>
+          <p:cNvSpPr/>
+          <p:nvPr/>
+        </p:nvSpPr>
+        <p:spPr>
+          <a:xfrm>
+            <a:off x="800100" y="491836"/>
+            <a:ext cx="10672401" cy="432089"/>
+          </a:xfrm>
+          <a:prstGeom prst="rect">
+            <a:avLst/>
+          </a:prstGeom>
+          <a:noFill/>
+          <a:ln>
+            <a:noFill/>
+          </a:ln>
+        </p:spPr>
+        <p:style>
+          <a:lnRef idx="2">
+            <a:schemeClr val="accent1">
+              <a:shade val="15000"/>
+            </a:schemeClr>
+          </a:lnRef>
+          <a:fillRef idx="1">
+            <a:schemeClr val="accent1"/>
+          </a:fillRef>
+          <a:effectRef idx="0">
+            <a:schemeClr val="accent1"/>
+          </a:effectRef>
+          <a:fontRef idx="minor">
+            <a:schemeClr val="lt1"/>
+          </a:fontRef>
+        </p:style>
+        <p:txBody>
+          <a:bodyPr rtlCol="0" anchor="ctr"/>
+          <a:lstStyle/>
+          <a:p>
+            <a:pPr algn="l"/>
+            <a:r>
+              <a:rPr lang="ko-KR" altLang="en-US" dirty="0">
+                <a:solidFill>
+                  <a:schemeClr val="tx1"/>
+                </a:solidFill>
+                <a:latin typeface="페이퍼로지 6 SemiBold" pitchFamily="2" charset="-127"/>
+                <a:ea typeface="페이퍼로지 6 SemiBold" pitchFamily="2" charset="-127"/>
+                <a:cs typeface="Pretendard Medium" panose="02000603000000020004" pitchFamily="2" charset="-127"/>
+              </a:rPr>
+              <a:t>스타트 씬 흐름도</a:t>
+            </a:r>
+          </a:p>
+        </p:txBody>
+      </p:sp>
+      <p:sp>
+        <p:nvSpPr>
+          <p:cNvPr id="5" name="다이아몬드 4">
+            <a:extLst>
+              <a:ext uri="{FF2B5EF4-FFF2-40B4-BE49-F238E27FC236}">
+                <a16:creationId xmlns:a16="http://schemas.microsoft.com/office/drawing/2014/main" id="{CC44C211-DDEF-2B40-1151-D8B5339D9E62}"/>
+              </a:ext>
+            </a:extLst>
+          </p:cNvPr>
+          <p:cNvSpPr/>
+          <p:nvPr/>
+        </p:nvSpPr>
+        <p:spPr>
+          <a:xfrm>
+            <a:off x="430718" y="563491"/>
+            <a:ext cx="288780" cy="288780"/>
+          </a:xfrm>
+          <a:prstGeom prst="diamond">
+            <a:avLst/>
+          </a:prstGeom>
+          <a:noFill/>
+          <a:ln w="19050">
+            <a:solidFill>
+              <a:schemeClr val="tx1"/>
+            </a:solidFill>
+          </a:ln>
+        </p:spPr>
+        <p:style>
+          <a:lnRef idx="2">
+            <a:schemeClr val="accent1">
+              <a:shade val="15000"/>
+            </a:schemeClr>
+          </a:lnRef>
+          <a:fillRef idx="1">
+            <a:schemeClr val="accent1"/>
+          </a:fillRef>
+          <a:effectRef idx="0">
+            <a:schemeClr val="accent1"/>
+          </a:effectRef>
+          <a:fontRef idx="minor">
+            <a:schemeClr val="lt1"/>
+          </a:fontRef>
+        </p:style>
+        <p:txBody>
+          <a:bodyPr rtlCol="0" anchor="ctr"/>
+          <a:lstStyle/>
+          <a:p>
+            <a:pPr algn="l"/>
+            <a:endParaRPr lang="ko-KR" altLang="en-US" sz="1600" dirty="0">
+              <a:solidFill>
+                <a:schemeClr val="tx1"/>
+              </a:solidFill>
+              <a:latin typeface="페이퍼로지 5 Medium" pitchFamily="2" charset="-127"/>
+              <a:ea typeface="페이퍼로지 5 Medium" pitchFamily="2" charset="-127"/>
+              <a:cs typeface="Pretendard Medium" panose="02000603000000020004" pitchFamily="2" charset="-127"/>
+            </a:endParaRPr>
+          </a:p>
+        </p:txBody>
+      </p:sp>
+      <p:sp>
+        <p:nvSpPr>
+          <p:cNvPr id="6" name="순서도: 수행의 시작/종료 5">
+            <a:extLst>
+              <a:ext uri="{FF2B5EF4-FFF2-40B4-BE49-F238E27FC236}">
+                <a16:creationId xmlns:a16="http://schemas.microsoft.com/office/drawing/2014/main" id="{29FCA1BF-1FD1-5C10-466A-8BBFC161CD7D}"/>
+              </a:ext>
+            </a:extLst>
+          </p:cNvPr>
+          <p:cNvSpPr/>
+          <p:nvPr/>
+        </p:nvSpPr>
+        <p:spPr>
+          <a:xfrm>
+            <a:off x="800100" y="1233829"/>
+            <a:ext cx="1381126" cy="481066"/>
+          </a:xfrm>
+          <a:prstGeom prst="flowChartTerminator">
+            <a:avLst/>
+          </a:prstGeom>
+          <a:solidFill>
+            <a:schemeClr val="accent2"/>
+          </a:solidFill>
+          <a:ln>
+            <a:solidFill>
+              <a:schemeClr val="tx1"/>
+            </a:solidFill>
+          </a:ln>
+        </p:spPr>
+        <p:style>
+          <a:lnRef idx="2">
+            <a:schemeClr val="accent1">
+              <a:shade val="15000"/>
+            </a:schemeClr>
+          </a:lnRef>
+          <a:fillRef idx="1">
+            <a:schemeClr val="accent1"/>
+          </a:fillRef>
+          <a:effectRef idx="0">
+            <a:schemeClr val="accent1"/>
+          </a:effectRef>
+          <a:fontRef idx="minor">
+            <a:schemeClr val="lt1"/>
+          </a:fontRef>
+        </p:style>
+        <p:txBody>
+          <a:bodyPr rtlCol="0" anchor="ctr"/>
+          <a:lstStyle/>
+          <a:p>
+            <a:pPr algn="ctr"/>
+            <a:r>
+              <a:rPr lang="ko-KR" altLang="en-US" sz="1200" dirty="0">
+                <a:solidFill>
+                  <a:schemeClr val="tx1"/>
+                </a:solidFill>
+                <a:latin typeface="페이퍼로지 4 Regular" pitchFamily="2" charset="-127"/>
+                <a:ea typeface="페이퍼로지 4 Regular" pitchFamily="2" charset="-127"/>
+              </a:rPr>
+              <a:t>시작</a:t>
+            </a:r>
+          </a:p>
+        </p:txBody>
+      </p:sp>
+      <p:sp>
+        <p:nvSpPr>
+          <p:cNvPr id="7" name="순서도: 수행의 시작/종료 6">
+            <a:extLst>
+              <a:ext uri="{FF2B5EF4-FFF2-40B4-BE49-F238E27FC236}">
+                <a16:creationId xmlns:a16="http://schemas.microsoft.com/office/drawing/2014/main" id="{BC4B56F0-66F9-0804-2C74-269F2781827F}"/>
+              </a:ext>
+            </a:extLst>
+          </p:cNvPr>
+          <p:cNvSpPr/>
+          <p:nvPr/>
+        </p:nvSpPr>
+        <p:spPr>
+          <a:xfrm>
+            <a:off x="800100" y="5383638"/>
+            <a:ext cx="1381126" cy="481066"/>
+          </a:xfrm>
+          <a:prstGeom prst="flowChartTerminator">
+            <a:avLst/>
+          </a:prstGeom>
+          <a:solidFill>
+            <a:schemeClr val="accent2"/>
+          </a:solidFill>
+          <a:ln>
+            <a:solidFill>
+              <a:schemeClr val="tx1"/>
+            </a:solidFill>
+          </a:ln>
+        </p:spPr>
+        <p:style>
+          <a:lnRef idx="2">
+            <a:schemeClr val="accent1">
+              <a:shade val="15000"/>
+            </a:schemeClr>
+          </a:lnRef>
+          <a:fillRef idx="1">
+            <a:schemeClr val="accent1"/>
+          </a:fillRef>
+          <a:effectRef idx="0">
+            <a:schemeClr val="accent1"/>
+          </a:effectRef>
+          <a:fontRef idx="minor">
+            <a:schemeClr val="lt1"/>
+          </a:fontRef>
+        </p:style>
+        <p:txBody>
+          <a:bodyPr rtlCol="0" anchor="ctr"/>
+          <a:lstStyle/>
+          <a:p>
+            <a:pPr algn="ctr"/>
+            <a:r>
+              <a:rPr lang="ko-KR" altLang="en-US" sz="1200" dirty="0">
+                <a:solidFill>
+                  <a:schemeClr val="tx1"/>
+                </a:solidFill>
+                <a:latin typeface="페이퍼로지 4 Regular" pitchFamily="2" charset="-127"/>
+                <a:ea typeface="페이퍼로지 4 Regular" pitchFamily="2" charset="-127"/>
+              </a:rPr>
+              <a:t>종료</a:t>
+            </a:r>
+          </a:p>
+        </p:txBody>
+      </p:sp>
+      <p:sp>
+        <p:nvSpPr>
+          <p:cNvPr id="8" name="순서도: 대체 처리 7">
+            <a:extLst>
+              <a:ext uri="{FF2B5EF4-FFF2-40B4-BE49-F238E27FC236}">
+                <a16:creationId xmlns:a16="http://schemas.microsoft.com/office/drawing/2014/main" id="{5AAAFD50-A5C0-0BD7-1DAB-9392EF730291}"/>
+              </a:ext>
+            </a:extLst>
+          </p:cNvPr>
+          <p:cNvSpPr/>
+          <p:nvPr/>
+        </p:nvSpPr>
+        <p:spPr>
+          <a:xfrm>
+            <a:off x="800100" y="1986016"/>
+            <a:ext cx="1381126" cy="481066"/>
+          </a:xfrm>
+          <a:prstGeom prst="flowChartAlternateProcess">
+            <a:avLst/>
+          </a:prstGeom>
+          <a:noFill/>
+          <a:ln>
+            <a:solidFill>
+              <a:schemeClr val="tx1"/>
+            </a:solidFill>
+          </a:ln>
+        </p:spPr>
+        <p:style>
+          <a:lnRef idx="2">
+            <a:schemeClr val="accent1">
+              <a:shade val="15000"/>
+            </a:schemeClr>
+          </a:lnRef>
+          <a:fillRef idx="1">
+            <a:schemeClr val="accent1"/>
+          </a:fillRef>
+          <a:effectRef idx="0">
+            <a:schemeClr val="accent1"/>
+          </a:effectRef>
+          <a:fontRef idx="minor">
+            <a:schemeClr val="lt1"/>
+          </a:fontRef>
+        </p:style>
+        <p:txBody>
+          <a:bodyPr rtlCol="0" anchor="ctr"/>
+          <a:lstStyle/>
+          <a:p>
+            <a:pPr algn="ctr"/>
+            <a:endParaRPr lang="ko-KR" altLang="en-US" sz="1200" dirty="0">
+              <a:solidFill>
+                <a:schemeClr val="tx1"/>
+              </a:solidFill>
+              <a:latin typeface="페이퍼로지 4 Regular" pitchFamily="2" charset="-127"/>
+              <a:ea typeface="페이퍼로지 4 Regular" pitchFamily="2" charset="-127"/>
+            </a:endParaRPr>
+          </a:p>
+        </p:txBody>
+      </p:sp>
+    </p:spTree>
+    <p:extLst>
+      <p:ext uri="{BB962C8B-B14F-4D97-AF65-F5344CB8AC3E}">
+        <p14:creationId xmlns:p14="http://schemas.microsoft.com/office/powerpoint/2010/main" val="2622879861"/>
+      </p:ext>
+    </p:extLst>
+  </p:cSld>
+  <p:clrMapOvr>
+    <a:masterClrMapping/>
+  </p:clrMapOvr>
+</p:sld>
+</file>
+
+<file path=ppt/slides/slide8.xml><?xml version="1.0" encoding="utf-8"?>
+<p:sld xmlns:a="http://schemas.openxmlformats.org/drawingml/2006/main" xmlns:r="http://schemas.openxmlformats.org/officeDocument/2006/relationships" xmlns:p="http://schemas.openxmlformats.org/presentationml/2006/main">
+  <p:cSld>
+    <p:spTree>
+      <p:nvGrpSpPr>
+        <p:cNvPr id="1" name="">
+          <a:extLst>
+            <a:ext uri="{FF2B5EF4-FFF2-40B4-BE49-F238E27FC236}">
+              <a16:creationId xmlns:a16="http://schemas.microsoft.com/office/drawing/2014/main" id="{2E947A78-318A-8E93-4490-28AF3C46A8AA}"/>
+            </a:ext>
+          </a:extLst>
+        </p:cNvPr>
+        <p:cNvGrpSpPr/>
+        <p:nvPr/>
+      </p:nvGrpSpPr>
+      <p:grpSpPr>
+        <a:xfrm>
+          <a:off x="0" y="0"/>
+          <a:ext cx="0" cy="0"/>
+          <a:chOff x="0" y="0"/>
+          <a:chExt cx="0" cy="0"/>
+        </a:xfrm>
+      </p:grpSpPr>
+      <p:sp>
+        <p:nvSpPr>
+          <p:cNvPr id="3" name="사각형: 잘린 대각선 방향 모서리 2">
+            <a:extLst>
+              <a:ext uri="{FF2B5EF4-FFF2-40B4-BE49-F238E27FC236}">
+                <a16:creationId xmlns:a16="http://schemas.microsoft.com/office/drawing/2014/main" id="{B185CCB8-A88A-B465-1BBE-7B7BD46E7009}"/>
+              </a:ext>
+            </a:extLst>
+          </p:cNvPr>
+          <p:cNvSpPr/>
+          <p:nvPr/>
+        </p:nvSpPr>
+        <p:spPr>
+          <a:xfrm>
+            <a:off x="212436" y="230909"/>
+            <a:ext cx="11767127" cy="6437746"/>
+          </a:xfrm>
+          <a:prstGeom prst="snip2DiagRect">
+            <a:avLst>
+              <a:gd name="adj1" fmla="val 0"/>
+              <a:gd name="adj2" fmla="val 6911"/>
+            </a:avLst>
+          </a:prstGeom>
+          <a:noFill/>
+          <a:ln w="53975">
+            <a:solidFill>
+              <a:schemeClr val="tx1"/>
+            </a:solidFill>
+          </a:ln>
+        </p:spPr>
+        <p:style>
+          <a:lnRef idx="2">
+            <a:schemeClr val="accent1">
+              <a:shade val="15000"/>
+            </a:schemeClr>
+          </a:lnRef>
+          <a:fillRef idx="1">
+            <a:schemeClr val="accent1"/>
+          </a:fillRef>
+          <a:effectRef idx="0">
+            <a:schemeClr val="accent1"/>
+          </a:effectRef>
+          <a:fontRef idx="minor">
+            <a:schemeClr val="lt1"/>
+          </a:fontRef>
+        </p:style>
+        <p:txBody>
+          <a:bodyPr rtlCol="0" anchor="ctr"/>
+          <a:lstStyle/>
+          <a:p>
+            <a:pPr algn="ctr"/>
+            <a:endParaRPr lang="ko-KR" altLang="en-US"/>
+          </a:p>
+        </p:txBody>
+      </p:sp>
+      <p:sp>
+        <p:nvSpPr>
+          <p:cNvPr id="4" name="직사각형 3">
+            <a:extLst>
+              <a:ext uri="{FF2B5EF4-FFF2-40B4-BE49-F238E27FC236}">
+                <a16:creationId xmlns:a16="http://schemas.microsoft.com/office/drawing/2014/main" id="{1C27A91A-6F88-33EC-84B0-B68C58C6A75E}"/>
+              </a:ext>
+            </a:extLst>
+          </p:cNvPr>
+          <p:cNvSpPr/>
+          <p:nvPr/>
+        </p:nvSpPr>
+        <p:spPr>
+          <a:xfrm>
+            <a:off x="800100" y="491836"/>
+            <a:ext cx="10672401" cy="432089"/>
+          </a:xfrm>
+          <a:prstGeom prst="rect">
+            <a:avLst/>
+          </a:prstGeom>
+          <a:noFill/>
+          <a:ln>
+            <a:noFill/>
+          </a:ln>
+        </p:spPr>
+        <p:style>
+          <a:lnRef idx="2">
+            <a:schemeClr val="accent1">
+              <a:shade val="15000"/>
+            </a:schemeClr>
+          </a:lnRef>
+          <a:fillRef idx="1">
+            <a:schemeClr val="accent1"/>
+          </a:fillRef>
+          <a:effectRef idx="0">
+            <a:schemeClr val="accent1"/>
+          </a:effectRef>
+          <a:fontRef idx="minor">
+            <a:schemeClr val="lt1"/>
+          </a:fontRef>
+        </p:style>
+        <p:txBody>
+          <a:bodyPr rtlCol="0" anchor="ctr"/>
+          <a:lstStyle/>
+          <a:p>
+            <a:pPr algn="l"/>
+            <a:r>
+              <a:rPr lang="ko-KR" altLang="en-US" dirty="0">
+                <a:solidFill>
+                  <a:schemeClr val="tx1"/>
+                </a:solidFill>
+                <a:latin typeface="페이퍼로지 6 SemiBold" pitchFamily="2" charset="-127"/>
+                <a:ea typeface="페이퍼로지 6 SemiBold" pitchFamily="2" charset="-127"/>
+                <a:cs typeface="Pretendard Medium" panose="02000603000000020004" pitchFamily="2" charset="-127"/>
+              </a:rPr>
+              <a:t>스타트 씬 흐름도</a:t>
+            </a:r>
+          </a:p>
+        </p:txBody>
+      </p:sp>
+      <p:sp>
+        <p:nvSpPr>
+          <p:cNvPr id="5" name="다이아몬드 4">
+            <a:extLst>
+              <a:ext uri="{FF2B5EF4-FFF2-40B4-BE49-F238E27FC236}">
+                <a16:creationId xmlns:a16="http://schemas.microsoft.com/office/drawing/2014/main" id="{69133EE7-333F-1B0E-7DBE-12A6B7C837D2}"/>
+              </a:ext>
+            </a:extLst>
+          </p:cNvPr>
+          <p:cNvSpPr/>
+          <p:nvPr/>
+        </p:nvSpPr>
+        <p:spPr>
+          <a:xfrm>
+            <a:off x="430718" y="563491"/>
+            <a:ext cx="288780" cy="288780"/>
+          </a:xfrm>
+          <a:prstGeom prst="diamond">
+            <a:avLst/>
+          </a:prstGeom>
+          <a:noFill/>
+          <a:ln w="19050">
+            <a:solidFill>
+              <a:schemeClr val="tx1"/>
+            </a:solidFill>
+          </a:ln>
+        </p:spPr>
+        <p:style>
+          <a:lnRef idx="2">
+            <a:schemeClr val="accent1">
+              <a:shade val="15000"/>
+            </a:schemeClr>
+          </a:lnRef>
+          <a:fillRef idx="1">
+            <a:schemeClr val="accent1"/>
+          </a:fillRef>
+          <a:effectRef idx="0">
+            <a:schemeClr val="accent1"/>
+          </a:effectRef>
+          <a:fontRef idx="minor">
+            <a:schemeClr val="lt1"/>
+          </a:fontRef>
+        </p:style>
+        <p:txBody>
+          <a:bodyPr rtlCol="0" anchor="ctr"/>
+          <a:lstStyle/>
+          <a:p>
+            <a:pPr algn="l"/>
+            <a:endParaRPr lang="ko-KR" altLang="en-US" sz="1600" dirty="0">
+              <a:solidFill>
+                <a:schemeClr val="tx1"/>
+              </a:solidFill>
+              <a:latin typeface="페이퍼로지 5 Medium" pitchFamily="2" charset="-127"/>
+              <a:ea typeface="페이퍼로지 5 Medium" pitchFamily="2" charset="-127"/>
+              <a:cs typeface="Pretendard Medium" panose="02000603000000020004" pitchFamily="2" charset="-127"/>
+            </a:endParaRPr>
+          </a:p>
+        </p:txBody>
+      </p:sp>
+      <p:sp>
+        <p:nvSpPr>
+          <p:cNvPr id="6" name="순서도: 수행의 시작/종료 5">
+            <a:extLst>
+              <a:ext uri="{FF2B5EF4-FFF2-40B4-BE49-F238E27FC236}">
+                <a16:creationId xmlns:a16="http://schemas.microsoft.com/office/drawing/2014/main" id="{DA4922C4-94FE-A980-B783-42F952A3DA7B}"/>
+              </a:ext>
+            </a:extLst>
+          </p:cNvPr>
+          <p:cNvSpPr/>
+          <p:nvPr/>
+        </p:nvSpPr>
+        <p:spPr>
+          <a:xfrm>
+            <a:off x="800100" y="1233829"/>
+            <a:ext cx="1381126" cy="481066"/>
+          </a:xfrm>
+          <a:prstGeom prst="flowChartTerminator">
+            <a:avLst/>
+          </a:prstGeom>
+          <a:solidFill>
+            <a:schemeClr val="accent2"/>
+          </a:solidFill>
+          <a:ln>
+            <a:solidFill>
+              <a:schemeClr val="tx1"/>
+            </a:solidFill>
+          </a:ln>
+        </p:spPr>
+        <p:style>
+          <a:lnRef idx="2">
+            <a:schemeClr val="accent1">
+              <a:shade val="15000"/>
+            </a:schemeClr>
+          </a:lnRef>
+          <a:fillRef idx="1">
+            <a:schemeClr val="accent1"/>
+          </a:fillRef>
+          <a:effectRef idx="0">
+            <a:schemeClr val="accent1"/>
+          </a:effectRef>
+          <a:fontRef idx="minor">
+            <a:schemeClr val="lt1"/>
+          </a:fontRef>
+        </p:style>
+        <p:txBody>
+          <a:bodyPr rtlCol="0" anchor="ctr"/>
+          <a:lstStyle/>
+          <a:p>
+            <a:pPr algn="ctr"/>
+            <a:r>
+              <a:rPr lang="ko-KR" altLang="en-US" sz="1200" dirty="0">
+                <a:solidFill>
+                  <a:schemeClr val="tx1"/>
+                </a:solidFill>
+                <a:latin typeface="페이퍼로지 4 Regular" pitchFamily="2" charset="-127"/>
+                <a:ea typeface="페이퍼로지 4 Regular" pitchFamily="2" charset="-127"/>
+              </a:rPr>
+              <a:t>시작</a:t>
+            </a:r>
+          </a:p>
+        </p:txBody>
+      </p:sp>
+      <p:sp>
+        <p:nvSpPr>
+          <p:cNvPr id="7" name="순서도: 수행의 시작/종료 6">
+            <a:extLst>
+              <a:ext uri="{FF2B5EF4-FFF2-40B4-BE49-F238E27FC236}">
+                <a16:creationId xmlns:a16="http://schemas.microsoft.com/office/drawing/2014/main" id="{01FC9C68-5A59-28D8-708B-D36962B067DD}"/>
+              </a:ext>
+            </a:extLst>
+          </p:cNvPr>
+          <p:cNvSpPr/>
+          <p:nvPr/>
+        </p:nvSpPr>
+        <p:spPr>
+          <a:xfrm>
+            <a:off x="800100" y="5383638"/>
+            <a:ext cx="1381126" cy="481066"/>
+          </a:xfrm>
+          <a:prstGeom prst="flowChartTerminator">
+            <a:avLst/>
+          </a:prstGeom>
+          <a:solidFill>
+            <a:schemeClr val="accent2"/>
+          </a:solidFill>
+          <a:ln>
+            <a:solidFill>
+              <a:schemeClr val="tx1"/>
+            </a:solidFill>
+          </a:ln>
+        </p:spPr>
+        <p:style>
+          <a:lnRef idx="2">
+            <a:schemeClr val="accent1">
+              <a:shade val="15000"/>
+            </a:schemeClr>
+          </a:lnRef>
+          <a:fillRef idx="1">
+            <a:schemeClr val="accent1"/>
+          </a:fillRef>
+          <a:effectRef idx="0">
+            <a:schemeClr val="accent1"/>
+          </a:effectRef>
+          <a:fontRef idx="minor">
+            <a:schemeClr val="lt1"/>
+          </a:fontRef>
+        </p:style>
+        <p:txBody>
+          <a:bodyPr rtlCol="0" anchor="ctr"/>
+          <a:lstStyle/>
+          <a:p>
+            <a:pPr algn="ctr"/>
+            <a:r>
+              <a:rPr lang="ko-KR" altLang="en-US" sz="1200" dirty="0">
+                <a:solidFill>
+                  <a:schemeClr val="tx1"/>
+                </a:solidFill>
+                <a:latin typeface="페이퍼로지 4 Regular" pitchFamily="2" charset="-127"/>
+                <a:ea typeface="페이퍼로지 4 Regular" pitchFamily="2" charset="-127"/>
+              </a:rPr>
+              <a:t>종료</a:t>
+            </a:r>
+          </a:p>
+        </p:txBody>
+      </p:sp>
+      <p:sp>
+        <p:nvSpPr>
+          <p:cNvPr id="8" name="순서도: 대체 처리 7">
+            <a:extLst>
+              <a:ext uri="{FF2B5EF4-FFF2-40B4-BE49-F238E27FC236}">
+                <a16:creationId xmlns:a16="http://schemas.microsoft.com/office/drawing/2014/main" id="{063A7E36-B96B-0961-D41F-0164C5CD2039}"/>
+              </a:ext>
+            </a:extLst>
+          </p:cNvPr>
+          <p:cNvSpPr/>
+          <p:nvPr/>
+        </p:nvSpPr>
+        <p:spPr>
+          <a:xfrm>
+            <a:off x="800100" y="1986016"/>
+            <a:ext cx="1381126" cy="481066"/>
+          </a:xfrm>
+          <a:prstGeom prst="flowChartAlternateProcess">
+            <a:avLst/>
+          </a:prstGeom>
+          <a:noFill/>
+          <a:ln>
+            <a:solidFill>
+              <a:schemeClr val="tx1"/>
+            </a:solidFill>
+          </a:ln>
+        </p:spPr>
+        <p:style>
+          <a:lnRef idx="2">
+            <a:schemeClr val="accent1">
+              <a:shade val="15000"/>
+            </a:schemeClr>
+          </a:lnRef>
+          <a:fillRef idx="1">
+            <a:schemeClr val="accent1"/>
+          </a:fillRef>
+          <a:effectRef idx="0">
+            <a:schemeClr val="accent1"/>
+          </a:effectRef>
+          <a:fontRef idx="minor">
+            <a:schemeClr val="lt1"/>
+          </a:fontRef>
+        </p:style>
+        <p:txBody>
+          <a:bodyPr rtlCol="0" anchor="ctr"/>
+          <a:lstStyle/>
+          <a:p>
+            <a:pPr algn="ctr"/>
+            <a:endParaRPr lang="ko-KR" altLang="en-US" sz="1200" dirty="0">
+              <a:solidFill>
+                <a:schemeClr val="tx1"/>
+              </a:solidFill>
+              <a:latin typeface="페이퍼로지 4 Regular" pitchFamily="2" charset="-127"/>
+              <a:ea typeface="페이퍼로지 4 Regular" pitchFamily="2" charset="-127"/>
+            </a:endParaRPr>
+          </a:p>
+        </p:txBody>
+      </p:sp>
+    </p:spTree>
+    <p:extLst>
+      <p:ext uri="{BB962C8B-B14F-4D97-AF65-F5344CB8AC3E}">
+        <p14:creationId xmlns:p14="http://schemas.microsoft.com/office/powerpoint/2010/main" val="3511705392"/>
+      </p:ext>
+    </p:extLst>
+  </p:cSld>
+  <p:clrMapOvr>
+    <a:masterClrMapping/>
+  </p:clrMapOvr>
+</p:sld>
+</file>
+
+<file path=ppt/slides/slide9.xml><?xml version="1.0" encoding="utf-8"?>
+<p:sld xmlns:a="http://schemas.openxmlformats.org/drawingml/2006/main" xmlns:r="http://schemas.openxmlformats.org/officeDocument/2006/relationships" xmlns:p="http://schemas.openxmlformats.org/presentationml/2006/main">
+  <p:cSld>
+    <p:spTree>
+      <p:nvGrpSpPr>
+        <p:cNvPr id="1" name="">
+          <a:extLst>
+            <a:ext uri="{FF2B5EF4-FFF2-40B4-BE49-F238E27FC236}">
+              <a16:creationId xmlns:a16="http://schemas.microsoft.com/office/drawing/2014/main" id="{1EB87793-3AD9-D1BE-2E15-E0D2876CB18F}"/>
+            </a:ext>
+          </a:extLst>
+        </p:cNvPr>
+        <p:cNvGrpSpPr/>
+        <p:nvPr/>
+      </p:nvGrpSpPr>
+      <p:grpSpPr>
+        <a:xfrm>
+          <a:off x="0" y="0"/>
+          <a:ext cx="0" cy="0"/>
+          <a:chOff x="0" y="0"/>
+          <a:chExt cx="0" cy="0"/>
+        </a:xfrm>
+      </p:grpSpPr>
+      <p:sp>
+        <p:nvSpPr>
+          <p:cNvPr id="3" name="사각형: 잘린 대각선 방향 모서리 2">
+            <a:extLst>
+              <a:ext uri="{FF2B5EF4-FFF2-40B4-BE49-F238E27FC236}">
+                <a16:creationId xmlns:a16="http://schemas.microsoft.com/office/drawing/2014/main" id="{921FD69A-3DE6-7869-4130-4DFC787A5DBE}"/>
+              </a:ext>
+            </a:extLst>
+          </p:cNvPr>
+          <p:cNvSpPr/>
+          <p:nvPr/>
+        </p:nvSpPr>
+        <p:spPr>
+          <a:xfrm>
+            <a:off x="212436" y="230909"/>
+            <a:ext cx="11767127" cy="6437746"/>
+          </a:xfrm>
+          <a:prstGeom prst="snip2DiagRect">
+            <a:avLst>
+              <a:gd name="adj1" fmla="val 0"/>
+              <a:gd name="adj2" fmla="val 6911"/>
+            </a:avLst>
+          </a:prstGeom>
+          <a:noFill/>
+          <a:ln w="53975">
+            <a:solidFill>
+              <a:schemeClr val="tx1"/>
+            </a:solidFill>
+          </a:ln>
+        </p:spPr>
+        <p:style>
+          <a:lnRef idx="2">
+            <a:schemeClr val="accent1">
+              <a:shade val="15000"/>
+            </a:schemeClr>
+          </a:lnRef>
+          <a:fillRef idx="1">
+            <a:schemeClr val="accent1"/>
+          </a:fillRef>
+          <a:effectRef idx="0">
+            <a:schemeClr val="accent1"/>
+          </a:effectRef>
+          <a:fontRef idx="minor">
+            <a:schemeClr val="lt1"/>
+          </a:fontRef>
+        </p:style>
+        <p:txBody>
+          <a:bodyPr rtlCol="0" anchor="ctr"/>
+          <a:lstStyle/>
+          <a:p>
+            <a:pPr algn="ctr"/>
+            <a:endParaRPr lang="ko-KR" altLang="en-US"/>
+          </a:p>
+        </p:txBody>
+      </p:sp>
+      <p:sp>
+        <p:nvSpPr>
+          <p:cNvPr id="4" name="직사각형 3">
+            <a:extLst>
+              <a:ext uri="{FF2B5EF4-FFF2-40B4-BE49-F238E27FC236}">
+                <a16:creationId xmlns:a16="http://schemas.microsoft.com/office/drawing/2014/main" id="{068B588A-059D-28B0-79CA-FE4134970442}"/>
+              </a:ext>
+            </a:extLst>
+          </p:cNvPr>
+          <p:cNvSpPr/>
+          <p:nvPr/>
+        </p:nvSpPr>
+        <p:spPr>
+          <a:xfrm>
+            <a:off x="800100" y="491836"/>
+            <a:ext cx="10672401" cy="432089"/>
+          </a:xfrm>
+          <a:prstGeom prst="rect">
+            <a:avLst/>
+          </a:prstGeom>
+          <a:noFill/>
+          <a:ln>
+            <a:noFill/>
+          </a:ln>
+        </p:spPr>
+        <p:style>
+          <a:lnRef idx="2">
+            <a:schemeClr val="accent1">
+              <a:shade val="15000"/>
+            </a:schemeClr>
+          </a:lnRef>
+          <a:fillRef idx="1">
+            <a:schemeClr val="accent1"/>
+          </a:fillRef>
+          <a:effectRef idx="0">
+            <a:schemeClr val="accent1"/>
+          </a:effectRef>
+          <a:fontRef idx="minor">
+            <a:schemeClr val="lt1"/>
+          </a:fontRef>
+        </p:style>
+        <p:txBody>
+          <a:bodyPr rtlCol="0" anchor="ctr"/>
+          <a:lstStyle/>
+          <a:p>
+            <a:pPr algn="l"/>
+            <a:r>
+              <a:rPr lang="ko-KR" altLang="en-US" dirty="0">
+                <a:solidFill>
+                  <a:schemeClr val="tx1"/>
+                </a:solidFill>
+                <a:latin typeface="페이퍼로지 6 SemiBold" pitchFamily="2" charset="-127"/>
+                <a:ea typeface="페이퍼로지 6 SemiBold" pitchFamily="2" charset="-127"/>
+                <a:cs typeface="Pretendard Medium" panose="02000603000000020004" pitchFamily="2" charset="-127"/>
+              </a:rPr>
+              <a:t>스타트 씬 흐름도</a:t>
+            </a:r>
+          </a:p>
+        </p:txBody>
+      </p:sp>
+      <p:sp>
+        <p:nvSpPr>
+          <p:cNvPr id="5" name="다이아몬드 4">
+            <a:extLst>
+              <a:ext uri="{FF2B5EF4-FFF2-40B4-BE49-F238E27FC236}">
+                <a16:creationId xmlns:a16="http://schemas.microsoft.com/office/drawing/2014/main" id="{A1B3931C-9220-C9AC-8E5F-C83B2373ADE6}"/>
+              </a:ext>
+            </a:extLst>
+          </p:cNvPr>
+          <p:cNvSpPr/>
+          <p:nvPr/>
+        </p:nvSpPr>
+        <p:spPr>
+          <a:xfrm>
+            <a:off x="430718" y="563491"/>
+            <a:ext cx="288780" cy="288780"/>
+          </a:xfrm>
+          <a:prstGeom prst="diamond">
+            <a:avLst/>
+          </a:prstGeom>
+          <a:noFill/>
+          <a:ln w="19050">
+            <a:solidFill>
+              <a:schemeClr val="tx1"/>
+            </a:solidFill>
+          </a:ln>
+        </p:spPr>
+        <p:style>
+          <a:lnRef idx="2">
+            <a:schemeClr val="accent1">
+              <a:shade val="15000"/>
+            </a:schemeClr>
+          </a:lnRef>
+          <a:fillRef idx="1">
+            <a:schemeClr val="accent1"/>
+          </a:fillRef>
+          <a:effectRef idx="0">
+            <a:schemeClr val="accent1"/>
+          </a:effectRef>
+          <a:fontRef idx="minor">
+            <a:schemeClr val="lt1"/>
+          </a:fontRef>
+        </p:style>
+        <p:txBody>
+          <a:bodyPr rtlCol="0" anchor="ctr"/>
+          <a:lstStyle/>
+          <a:p>
+            <a:pPr algn="l"/>
+            <a:endParaRPr lang="ko-KR" altLang="en-US" sz="1600" dirty="0">
+              <a:solidFill>
+                <a:schemeClr val="tx1"/>
+              </a:solidFill>
+              <a:latin typeface="페이퍼로지 5 Medium" pitchFamily="2" charset="-127"/>
+              <a:ea typeface="페이퍼로지 5 Medium" pitchFamily="2" charset="-127"/>
+              <a:cs typeface="Pretendard Medium" panose="02000603000000020004" pitchFamily="2" charset="-127"/>
+            </a:endParaRPr>
+          </a:p>
+        </p:txBody>
+      </p:sp>
+      <p:sp>
+        <p:nvSpPr>
+          <p:cNvPr id="6" name="순서도: 수행의 시작/종료 5">
+            <a:extLst>
+              <a:ext uri="{FF2B5EF4-FFF2-40B4-BE49-F238E27FC236}">
+                <a16:creationId xmlns:a16="http://schemas.microsoft.com/office/drawing/2014/main" id="{108E799C-780E-85CC-26F3-0B61F06B6543}"/>
+              </a:ext>
+            </a:extLst>
+          </p:cNvPr>
+          <p:cNvSpPr/>
+          <p:nvPr/>
+        </p:nvSpPr>
+        <p:spPr>
+          <a:xfrm>
+            <a:off x="800100" y="1233829"/>
+            <a:ext cx="1381126" cy="481066"/>
+          </a:xfrm>
+          <a:prstGeom prst="flowChartTerminator">
+            <a:avLst/>
+          </a:prstGeom>
+          <a:solidFill>
+            <a:schemeClr val="accent2"/>
+          </a:solidFill>
+          <a:ln>
+            <a:solidFill>
+              <a:schemeClr val="tx1"/>
+            </a:solidFill>
+          </a:ln>
+        </p:spPr>
+        <p:style>
+          <a:lnRef idx="2">
+            <a:schemeClr val="accent1">
+              <a:shade val="15000"/>
+            </a:schemeClr>
+          </a:lnRef>
+          <a:fillRef idx="1">
+            <a:schemeClr val="accent1"/>
+          </a:fillRef>
+          <a:effectRef idx="0">
+            <a:schemeClr val="accent1"/>
+          </a:effectRef>
+          <a:fontRef idx="minor">
+            <a:schemeClr val="lt1"/>
+          </a:fontRef>
+        </p:style>
+        <p:txBody>
+          <a:bodyPr rtlCol="0" anchor="ctr"/>
+          <a:lstStyle/>
+          <a:p>
+            <a:pPr algn="ctr"/>
+            <a:r>
+              <a:rPr lang="ko-KR" altLang="en-US" sz="1200" dirty="0">
+                <a:solidFill>
+                  <a:schemeClr val="tx1"/>
+                </a:solidFill>
+                <a:latin typeface="페이퍼로지 4 Regular" pitchFamily="2" charset="-127"/>
+                <a:ea typeface="페이퍼로지 4 Regular" pitchFamily="2" charset="-127"/>
+              </a:rPr>
+              <a:t>시작</a:t>
+            </a:r>
+          </a:p>
+        </p:txBody>
+      </p:sp>
+      <p:sp>
+        <p:nvSpPr>
+          <p:cNvPr id="7" name="순서도: 수행의 시작/종료 6">
+            <a:extLst>
+              <a:ext uri="{FF2B5EF4-FFF2-40B4-BE49-F238E27FC236}">
+                <a16:creationId xmlns:a16="http://schemas.microsoft.com/office/drawing/2014/main" id="{E7B00E1D-DA7E-D576-99AF-D534935976FA}"/>
+              </a:ext>
+            </a:extLst>
+          </p:cNvPr>
+          <p:cNvSpPr/>
+          <p:nvPr/>
+        </p:nvSpPr>
+        <p:spPr>
+          <a:xfrm>
+            <a:off x="800100" y="5383638"/>
+            <a:ext cx="1381126" cy="481066"/>
+          </a:xfrm>
+          <a:prstGeom prst="flowChartTerminator">
+            <a:avLst/>
+          </a:prstGeom>
+          <a:solidFill>
+            <a:schemeClr val="accent2"/>
+          </a:solidFill>
+          <a:ln>
+            <a:solidFill>
+              <a:schemeClr val="tx1"/>
+            </a:solidFill>
+          </a:ln>
+        </p:spPr>
+        <p:style>
+          <a:lnRef idx="2">
+            <a:schemeClr val="accent1">
+              <a:shade val="15000"/>
+            </a:schemeClr>
+          </a:lnRef>
+          <a:fillRef idx="1">
+            <a:schemeClr val="accent1"/>
+          </a:fillRef>
+          <a:effectRef idx="0">
+            <a:schemeClr val="accent1"/>
+          </a:effectRef>
+          <a:fontRef idx="minor">
+            <a:schemeClr val="lt1"/>
+          </a:fontRef>
+        </p:style>
+        <p:txBody>
+          <a:bodyPr rtlCol="0" anchor="ctr"/>
+          <a:lstStyle/>
+          <a:p>
+            <a:pPr algn="ctr"/>
+            <a:r>
+              <a:rPr lang="ko-KR" altLang="en-US" sz="1200" dirty="0">
+                <a:solidFill>
+                  <a:schemeClr val="tx1"/>
+                </a:solidFill>
+                <a:latin typeface="페이퍼로지 4 Regular" pitchFamily="2" charset="-127"/>
+                <a:ea typeface="페이퍼로지 4 Regular" pitchFamily="2" charset="-127"/>
+              </a:rPr>
+              <a:t>종료</a:t>
+            </a:r>
+          </a:p>
+        </p:txBody>
+      </p:sp>
+      <p:sp>
+        <p:nvSpPr>
+          <p:cNvPr id="8" name="순서도: 대체 처리 7">
+            <a:extLst>
+              <a:ext uri="{FF2B5EF4-FFF2-40B4-BE49-F238E27FC236}">
+                <a16:creationId xmlns:a16="http://schemas.microsoft.com/office/drawing/2014/main" id="{2CF3B1E4-61DA-D58F-2F4D-CB85C87B4744}"/>
+              </a:ext>
+            </a:extLst>
+          </p:cNvPr>
+          <p:cNvSpPr/>
+          <p:nvPr/>
+        </p:nvSpPr>
+        <p:spPr>
+          <a:xfrm>
+            <a:off x="800100" y="1986016"/>
+            <a:ext cx="1381126" cy="481066"/>
+          </a:xfrm>
+          <a:prstGeom prst="flowChartAlternateProcess">
+            <a:avLst/>
+          </a:prstGeom>
+          <a:noFill/>
+          <a:ln>
+            <a:solidFill>
+              <a:schemeClr val="tx1"/>
+            </a:solidFill>
+          </a:ln>
+        </p:spPr>
+        <p:style>
+          <a:lnRef idx="2">
+            <a:schemeClr val="accent1">
+              <a:shade val="15000"/>
+            </a:schemeClr>
+          </a:lnRef>
+          <a:fillRef idx="1">
+            <a:schemeClr val="accent1"/>
+          </a:fillRef>
+          <a:effectRef idx="0">
+            <a:schemeClr val="accent1"/>
+          </a:effectRef>
+          <a:fontRef idx="minor">
+            <a:schemeClr val="lt1"/>
+          </a:fontRef>
+        </p:style>
+        <p:txBody>
+          <a:bodyPr rtlCol="0" anchor="ctr"/>
+          <a:lstStyle/>
+          <a:p>
+            <a:pPr algn="ctr"/>
+            <a:endParaRPr lang="ko-KR" altLang="en-US" sz="1200" dirty="0">
+              <a:solidFill>
+                <a:schemeClr val="tx1"/>
+              </a:solidFill>
+              <a:latin typeface="페이퍼로지 4 Regular" pitchFamily="2" charset="-127"/>
+              <a:ea typeface="페이퍼로지 4 Regular" pitchFamily="2" charset="-127"/>
+            </a:endParaRPr>
+          </a:p>
+        </p:txBody>
+      </p:sp>
+    </p:spTree>
+    <p:extLst>
+      <p:ext uri="{BB962C8B-B14F-4D97-AF65-F5344CB8AC3E}">
+        <p14:creationId xmlns:p14="http://schemas.microsoft.com/office/powerpoint/2010/main" val="2629239817"/>
       </p:ext>
     </p:extLst>
   </p:cSld>

</xml_diff>